<commit_message>
Firma löschen und ändern funktioniert, Dashboard für i4a-Mitarbeiter soweit fertig
</commit_message>
<xml_diff>
--- a/Mockup-Dashboard.pptx
+++ b/Mockup-Dashboard.pptx
@@ -2,10 +2,11 @@
 <file path=ppt/presentation.xml><?xml version="1.0" encoding="utf-8"?>
 <p:presentation xmlns:a="http://schemas.openxmlformats.org/drawingml/2006/main" xmlns:r="http://schemas.openxmlformats.org/officeDocument/2006/relationships" xmlns:p="http://schemas.openxmlformats.org/presentationml/2006/main" saveSubsetFonts="1">
   <p:sldMasterIdLst>
-    <p:sldMasterId id="2147483648" r:id="rId40"/>
+    <p:sldMasterId id="2147483648" r:id="rId63"/>
   </p:sldMasterIdLst>
   <p:sldIdLst>
-    <p:sldId id="258" r:id="rId41"/>
+    <p:sldId id="258" r:id="rId64"/>
+    <p:sldId id="259" r:id="rId65"/>
   </p:sldIdLst>
   <p:sldSz cx="12192000" cy="6858000"/>
   <p:notesSz cx="6858000" cy="9144000"/>
@@ -243,7 +244,7 @@
           <a:p>
             <a:fld id="{0F7B7F50-FBEA-4777-AB20-1B1D4B355751}" type="datetimeFigureOut">
               <a:rPr lang="de-DE" smtClean="0"/>
-              <a:t>01.02.2017</a:t>
+              <a:t>07.02.2017</a:t>
             </a:fld>
             <a:endParaRPr lang="de-DE"/>
           </a:p>
@@ -413,7 +414,7 @@
           <a:p>
             <a:fld id="{0F7B7F50-FBEA-4777-AB20-1B1D4B355751}" type="datetimeFigureOut">
               <a:rPr lang="de-DE" smtClean="0"/>
-              <a:t>01.02.2017</a:t>
+              <a:t>07.02.2017</a:t>
             </a:fld>
             <a:endParaRPr lang="de-DE"/>
           </a:p>
@@ -593,7 +594,7 @@
           <a:p>
             <a:fld id="{0F7B7F50-FBEA-4777-AB20-1B1D4B355751}" type="datetimeFigureOut">
               <a:rPr lang="de-DE" smtClean="0"/>
-              <a:t>01.02.2017</a:t>
+              <a:t>07.02.2017</a:t>
             </a:fld>
             <a:endParaRPr lang="de-DE"/>
           </a:p>
@@ -763,7 +764,7 @@
           <a:p>
             <a:fld id="{0F7B7F50-FBEA-4777-AB20-1B1D4B355751}" type="datetimeFigureOut">
               <a:rPr lang="de-DE" smtClean="0"/>
-              <a:t>01.02.2017</a:t>
+              <a:t>07.02.2017</a:t>
             </a:fld>
             <a:endParaRPr lang="de-DE"/>
           </a:p>
@@ -1009,7 +1010,7 @@
           <a:p>
             <a:fld id="{0F7B7F50-FBEA-4777-AB20-1B1D4B355751}" type="datetimeFigureOut">
               <a:rPr lang="de-DE" smtClean="0"/>
-              <a:t>01.02.2017</a:t>
+              <a:t>07.02.2017</a:t>
             </a:fld>
             <a:endParaRPr lang="de-DE"/>
           </a:p>
@@ -1241,7 +1242,7 @@
           <a:p>
             <a:fld id="{0F7B7F50-FBEA-4777-AB20-1B1D4B355751}" type="datetimeFigureOut">
               <a:rPr lang="de-DE" smtClean="0"/>
-              <a:t>01.02.2017</a:t>
+              <a:t>07.02.2017</a:t>
             </a:fld>
             <a:endParaRPr lang="de-DE"/>
           </a:p>
@@ -1608,7 +1609,7 @@
           <a:p>
             <a:fld id="{0F7B7F50-FBEA-4777-AB20-1B1D4B355751}" type="datetimeFigureOut">
               <a:rPr lang="de-DE" smtClean="0"/>
-              <a:t>01.02.2017</a:t>
+              <a:t>07.02.2017</a:t>
             </a:fld>
             <a:endParaRPr lang="de-DE"/>
           </a:p>
@@ -1726,7 +1727,7 @@
           <a:p>
             <a:fld id="{0F7B7F50-FBEA-4777-AB20-1B1D4B355751}" type="datetimeFigureOut">
               <a:rPr lang="de-DE" smtClean="0"/>
-              <a:t>01.02.2017</a:t>
+              <a:t>07.02.2017</a:t>
             </a:fld>
             <a:endParaRPr lang="de-DE"/>
           </a:p>
@@ -1821,7 +1822,7 @@
           <a:p>
             <a:fld id="{0F7B7F50-FBEA-4777-AB20-1B1D4B355751}" type="datetimeFigureOut">
               <a:rPr lang="de-DE" smtClean="0"/>
-              <a:t>01.02.2017</a:t>
+              <a:t>07.02.2017</a:t>
             </a:fld>
             <a:endParaRPr lang="de-DE"/>
           </a:p>
@@ -2098,7 +2099,7 @@
           <a:p>
             <a:fld id="{0F7B7F50-FBEA-4777-AB20-1B1D4B355751}" type="datetimeFigureOut">
               <a:rPr lang="de-DE" smtClean="0"/>
-              <a:t>01.02.2017</a:t>
+              <a:t>07.02.2017</a:t>
             </a:fld>
             <a:endParaRPr lang="de-DE"/>
           </a:p>
@@ -2351,7 +2352,7 @@
           <a:p>
             <a:fld id="{0F7B7F50-FBEA-4777-AB20-1B1D4B355751}" type="datetimeFigureOut">
               <a:rPr lang="de-DE" smtClean="0"/>
-              <a:t>01.02.2017</a:t>
+              <a:t>07.02.2017</a:t>
             </a:fld>
             <a:endParaRPr lang="de-DE"/>
           </a:p>
@@ -2564,7 +2565,7 @@
           <a:p>
             <a:fld id="{0F7B7F50-FBEA-4777-AB20-1B1D4B355751}" type="datetimeFigureOut">
               <a:rPr lang="de-DE" smtClean="0"/>
-              <a:t>01.02.2017</a:t>
+              <a:t>07.02.2017</a:t>
             </a:fld>
             <a:endParaRPr lang="de-DE"/>
           </a:p>
@@ -6139,7 +6140,6 @@
               <a:rPr lang="en-US" sz="1400" dirty="0"/>
               <a:t>marco@itfox.at</a:t>
             </a:r>
-            <a:endParaRPr lang="en-US" sz="1400" dirty="0"/>
           </a:p>
         </p:txBody>
       </p:sp>
@@ -6393,19 +6393,6 @@
               </a:rPr>
               <a:t>…</a:t>
             </a:r>
-            <a:endParaRPr lang="en-US" sz="1400" u="sng" dirty="0" smtClean="0">
-              <a:solidFill>
-                <a:srgbClr val="0070C0"/>
-              </a:solidFill>
-              <a:uFill>
-                <a:solidFill>
-                  <a:srgbClr val="0070C0"/>
-                </a:solidFill>
-              </a:uFill>
-              <a:latin typeface="Segoe UI" pitchFamily="34" charset="0"/>
-              <a:ea typeface="Segoe UI" pitchFamily="34" charset="0"/>
-              <a:cs typeface="Segoe UI" pitchFamily="34" charset="0"/>
-            </a:endParaRPr>
           </a:p>
         </p:txBody>
       </p:sp>
@@ -6835,6 +6822,2801 @@
 </p:sld>
 </file>
 
+<file path=ppt/slides/slide2.xml><?xml version="1.0" encoding="utf-8"?>
+<p:sld xmlns:a="http://schemas.openxmlformats.org/drawingml/2006/main" xmlns:r="http://schemas.openxmlformats.org/officeDocument/2006/relationships" xmlns:p="http://schemas.openxmlformats.org/presentationml/2006/main">
+  <p:cSld>
+    <p:spTree>
+      <p:nvGrpSpPr>
+        <p:cNvPr id="1" name=""/>
+        <p:cNvGrpSpPr/>
+        <p:nvPr/>
+      </p:nvGrpSpPr>
+      <p:grpSpPr>
+        <a:xfrm>
+          <a:off x="0" y="0"/>
+          <a:ext cx="0" cy="0"/>
+          <a:chOff x="0" y="0"/>
+          <a:chExt cx="0" cy="0"/>
+        </a:xfrm>
+      </p:grpSpPr>
+      <p:grpSp>
+        <p:nvGrpSpPr>
+          <p:cNvPr id="2" name="WebBrowser"/>
+          <p:cNvGrpSpPr/>
+          <p:nvPr>
+            <p:custDataLst>
+              <p:custData r:id="rId1"/>
+            </p:custDataLst>
+          </p:nvPr>
+        </p:nvGrpSpPr>
+        <p:grpSpPr>
+          <a:xfrm>
+            <a:off x="1575090" y="-17418"/>
+            <a:ext cx="9144000" cy="6858000"/>
+            <a:chOff x="22515" y="0"/>
+            <a:chExt cx="9144000" cy="6858000"/>
+          </a:xfrm>
+        </p:grpSpPr>
+        <p:sp>
+          <p:nvSpPr>
+            <p:cNvPr id="3" name="Background"/>
+            <p:cNvSpPr/>
+            <p:nvPr/>
+          </p:nvSpPr>
+          <p:spPr>
+            <a:xfrm>
+              <a:off x="22515" y="0"/>
+              <a:ext cx="9144000" cy="6858000"/>
+            </a:xfrm>
+            <a:prstGeom prst="rect">
+              <a:avLst/>
+            </a:prstGeom>
+            <a:solidFill>
+              <a:srgbClr val="FFFFFF">
+                <a:lumMod val="65000"/>
+              </a:srgbClr>
+            </a:solidFill>
+            <a:ln w="3175" cap="flat" cmpd="sng" algn="ctr">
+              <a:solidFill>
+                <a:srgbClr val="000000">
+                  <a:lumMod val="50000"/>
+                  <a:lumOff val="50000"/>
+                </a:srgbClr>
+              </a:solidFill>
+              <a:prstDash val="solid"/>
+            </a:ln>
+            <a:effectLst/>
+          </p:spPr>
+          <p:txBody>
+            <a:bodyPr rtlCol="0" anchor="ctr"/>
+            <a:lstStyle/>
+            <a:p>
+              <a:pPr algn="ctr"/>
+              <a:endParaRPr lang="en-US" sz="1050" kern="0" dirty="0">
+                <a:solidFill>
+                  <a:prstClr val="white"/>
+                </a:solidFill>
+                <a:latin typeface="Segoe UI"/>
+              </a:endParaRPr>
+            </a:p>
+          </p:txBody>
+        </p:sp>
+        <p:sp>
+          <p:nvSpPr>
+            <p:cNvPr id="4" name="WindowTitle"/>
+            <p:cNvSpPr txBox="1"/>
+            <p:nvPr/>
+          </p:nvSpPr>
+          <p:spPr>
+            <a:xfrm>
+              <a:off x="22515" y="22341"/>
+              <a:ext cx="1435458" cy="230832"/>
+            </a:xfrm>
+            <a:prstGeom prst="rect">
+              <a:avLst/>
+            </a:prstGeom>
+            <a:noFill/>
+          </p:spPr>
+          <p:txBody>
+            <a:bodyPr wrap="none" lIns="91440" tIns="18288" rIns="91440" bIns="27432" rtlCol="0" anchor="ctr" anchorCtr="0">
+              <a:spAutoFit/>
+            </a:bodyPr>
+            <a:lstStyle/>
+            <a:p>
+              <a:r>
+                <a:rPr lang="en-US" sz="1200" dirty="0" smtClean="0">
+                  <a:solidFill>
+                    <a:prstClr val="white"/>
+                  </a:solidFill>
+                  <a:latin typeface="Segoe UI" pitchFamily="34" charset="0"/>
+                  <a:ea typeface="Segoe UI" pitchFamily="34" charset="0"/>
+                  <a:cs typeface="Segoe UI" pitchFamily="34" charset="0"/>
+                </a:rPr>
+                <a:t>innovation4austria</a:t>
+              </a:r>
+            </a:p>
+          </p:txBody>
+        </p:sp>
+        <p:grpSp>
+          <p:nvGrpSpPr>
+            <p:cNvPr id="5" name="Group 4"/>
+            <p:cNvGrpSpPr/>
+            <p:nvPr/>
+          </p:nvGrpSpPr>
+          <p:grpSpPr>
+            <a:xfrm>
+              <a:off x="81598" y="286385"/>
+              <a:ext cx="320040" cy="316520"/>
+              <a:chOff x="72073" y="221749"/>
+              <a:chExt cx="320040" cy="316520"/>
+            </a:xfrm>
+          </p:grpSpPr>
+          <p:sp>
+            <p:nvSpPr>
+              <p:cNvPr id="29" name="Oval 28"/>
+              <p:cNvSpPr/>
+              <p:nvPr/>
+            </p:nvSpPr>
+            <p:spPr>
+              <a:xfrm>
+                <a:off x="72073" y="221749"/>
+                <a:ext cx="320040" cy="316520"/>
+              </a:xfrm>
+              <a:prstGeom prst="ellipse">
+                <a:avLst/>
+              </a:prstGeom>
+              <a:gradFill flip="none" rotWithShape="1">
+                <a:gsLst>
+                  <a:gs pos="91000">
+                    <a:srgbClr val="FFFFFF">
+                      <a:lumMod val="85000"/>
+                    </a:srgbClr>
+                  </a:gs>
+                  <a:gs pos="36000">
+                    <a:srgbClr val="FFFFFF">
+                      <a:lumMod val="95000"/>
+                    </a:srgbClr>
+                  </a:gs>
+                  <a:gs pos="100000">
+                    <a:srgbClr val="FFFFFF">
+                      <a:lumMod val="95000"/>
+                    </a:srgbClr>
+                  </a:gs>
+                </a:gsLst>
+                <a:lin ang="5400000" scaled="0"/>
+                <a:tileRect/>
+              </a:gradFill>
+              <a:ln w="3175">
+                <a:solidFill>
+                  <a:srgbClr val="000000">
+                    <a:lumMod val="50000"/>
+                    <a:lumOff val="50000"/>
+                  </a:srgbClr>
+                </a:solidFill>
+              </a:ln>
+              <a:effectLst/>
+            </p:spPr>
+            <p:style>
+              <a:lnRef idx="2">
+                <a:srgbClr val="4F81BD">
+                  <a:shade val="50000"/>
+                </a:srgbClr>
+              </a:lnRef>
+              <a:fillRef idx="1">
+                <a:srgbClr val="4F81BD"/>
+              </a:fillRef>
+              <a:effectRef idx="0">
+                <a:srgbClr val="4F81BD"/>
+              </a:effectRef>
+              <a:fontRef idx="minor">
+                <a:srgbClr val="000000"/>
+              </a:fontRef>
+            </p:style>
+            <p:txBody>
+              <a:bodyPr rtlCol="0" anchor="ctr"/>
+              <a:lstStyle/>
+              <a:p>
+                <a:pPr algn="ctr"/>
+                <a:endParaRPr lang="en-US" sz="1050" u="sng">
+                  <a:solidFill>
+                    <a:prstClr val="white"/>
+                  </a:solidFill>
+                </a:endParaRPr>
+              </a:p>
+            </p:txBody>
+          </p:sp>
+          <p:sp>
+            <p:nvSpPr>
+              <p:cNvPr id="30" name="Left Arrow 29"/>
+              <p:cNvSpPr/>
+              <p:nvPr/>
+            </p:nvSpPr>
+            <p:spPr>
+              <a:xfrm>
+                <a:off x="109358" y="275511"/>
+                <a:ext cx="223134" cy="208997"/>
+              </a:xfrm>
+              <a:prstGeom prst="leftArrow">
+                <a:avLst/>
+              </a:prstGeom>
+              <a:solidFill>
+                <a:sysClr val="window" lastClr="FFFFFF"/>
+              </a:solidFill>
+              <a:ln w="3175" cap="flat" cmpd="sng" algn="ctr">
+                <a:solidFill>
+                  <a:sysClr val="windowText" lastClr="000000">
+                    <a:lumMod val="75000"/>
+                    <a:lumOff val="25000"/>
+                  </a:sysClr>
+                </a:solidFill>
+                <a:prstDash val="solid"/>
+              </a:ln>
+              <a:effectLst/>
+            </p:spPr>
+            <p:txBody>
+              <a:bodyPr rtlCol="0" anchor="ctr"/>
+              <a:lstStyle/>
+              <a:p>
+                <a:pPr algn="ctr"/>
+                <a:endParaRPr lang="en-US" sz="1050" kern="0">
+                  <a:solidFill>
+                    <a:prstClr val="white"/>
+                  </a:solidFill>
+                  <a:latin typeface="Segoe UI"/>
+                </a:endParaRPr>
+              </a:p>
+            </p:txBody>
+          </p:sp>
+        </p:grpSp>
+        <p:grpSp>
+          <p:nvGrpSpPr>
+            <p:cNvPr id="6" name="Group 5"/>
+            <p:cNvGrpSpPr/>
+            <p:nvPr/>
+          </p:nvGrpSpPr>
+          <p:grpSpPr>
+            <a:xfrm>
+              <a:off x="453671" y="286384"/>
+              <a:ext cx="320040" cy="316520"/>
+              <a:chOff x="444146" y="221748"/>
+              <a:chExt cx="320040" cy="316520"/>
+            </a:xfrm>
+          </p:grpSpPr>
+          <p:sp>
+            <p:nvSpPr>
+              <p:cNvPr id="27" name="Oval 26"/>
+              <p:cNvSpPr/>
+              <p:nvPr/>
+            </p:nvSpPr>
+            <p:spPr>
+              <a:xfrm>
+                <a:off x="444146" y="221748"/>
+                <a:ext cx="320040" cy="316520"/>
+              </a:xfrm>
+              <a:prstGeom prst="ellipse">
+                <a:avLst/>
+              </a:prstGeom>
+              <a:gradFill flip="none" rotWithShape="1">
+                <a:gsLst>
+                  <a:gs pos="91000">
+                    <a:srgbClr val="FFFFFF">
+                      <a:lumMod val="85000"/>
+                    </a:srgbClr>
+                  </a:gs>
+                  <a:gs pos="36000">
+                    <a:srgbClr val="FFFFFF">
+                      <a:lumMod val="95000"/>
+                    </a:srgbClr>
+                  </a:gs>
+                  <a:gs pos="100000">
+                    <a:srgbClr val="FFFFFF">
+                      <a:lumMod val="95000"/>
+                    </a:srgbClr>
+                  </a:gs>
+                </a:gsLst>
+                <a:lin ang="5400000" scaled="0"/>
+                <a:tileRect/>
+              </a:gradFill>
+              <a:ln w="3175">
+                <a:solidFill>
+                  <a:srgbClr val="000000">
+                    <a:lumMod val="50000"/>
+                    <a:lumOff val="50000"/>
+                  </a:srgbClr>
+                </a:solidFill>
+              </a:ln>
+              <a:effectLst/>
+            </p:spPr>
+            <p:style>
+              <a:lnRef idx="2">
+                <a:srgbClr val="4F81BD">
+                  <a:shade val="50000"/>
+                </a:srgbClr>
+              </a:lnRef>
+              <a:fillRef idx="1">
+                <a:srgbClr val="4F81BD"/>
+              </a:fillRef>
+              <a:effectRef idx="0">
+                <a:srgbClr val="4F81BD"/>
+              </a:effectRef>
+              <a:fontRef idx="minor">
+                <a:srgbClr val="000000"/>
+              </a:fontRef>
+            </p:style>
+            <p:txBody>
+              <a:bodyPr rtlCol="0" anchor="ctr"/>
+              <a:lstStyle/>
+              <a:p>
+                <a:pPr algn="ctr"/>
+                <a:endParaRPr lang="en-US" sz="1050" u="sng">
+                  <a:solidFill>
+                    <a:prstClr val="white"/>
+                  </a:solidFill>
+                </a:endParaRPr>
+              </a:p>
+            </p:txBody>
+          </p:sp>
+          <p:sp>
+            <p:nvSpPr>
+              <p:cNvPr id="28" name="Right Arrow 27"/>
+              <p:cNvSpPr/>
+              <p:nvPr/>
+            </p:nvSpPr>
+            <p:spPr>
+              <a:xfrm>
+                <a:off x="481249" y="275509"/>
+                <a:ext cx="257146" cy="208999"/>
+              </a:xfrm>
+              <a:prstGeom prst="rightArrow">
+                <a:avLst/>
+              </a:prstGeom>
+              <a:solidFill>
+                <a:sysClr val="window" lastClr="FFFFFF"/>
+              </a:solidFill>
+              <a:ln w="3175" cap="flat" cmpd="sng" algn="ctr">
+                <a:solidFill>
+                  <a:sysClr val="windowText" lastClr="000000">
+                    <a:lumMod val="75000"/>
+                    <a:lumOff val="25000"/>
+                  </a:sysClr>
+                </a:solidFill>
+                <a:prstDash val="solid"/>
+              </a:ln>
+              <a:effectLst/>
+            </p:spPr>
+            <p:txBody>
+              <a:bodyPr rtlCol="0" anchor="ctr"/>
+              <a:lstStyle/>
+              <a:p>
+                <a:pPr algn="ctr"/>
+                <a:endParaRPr lang="en-US" sz="1050" kern="0">
+                  <a:solidFill>
+                    <a:prstClr val="white"/>
+                  </a:solidFill>
+                  <a:latin typeface="Segoe UI"/>
+                </a:endParaRPr>
+              </a:p>
+            </p:txBody>
+          </p:sp>
+        </p:grpSp>
+        <p:grpSp>
+          <p:nvGrpSpPr>
+            <p:cNvPr id="7" name="Minimize - Maximize - Close"/>
+            <p:cNvGrpSpPr/>
+            <p:nvPr/>
+          </p:nvGrpSpPr>
+          <p:grpSpPr>
+            <a:xfrm>
+              <a:off x="8632311" y="92599"/>
+              <a:ext cx="384527" cy="78032"/>
+              <a:chOff x="9347642" y="131588"/>
+              <a:chExt cx="384527" cy="78032"/>
+            </a:xfrm>
+          </p:grpSpPr>
+          <p:cxnSp>
+            <p:nvCxnSpPr>
+              <p:cNvPr id="22" name="Line"/>
+              <p:cNvCxnSpPr/>
+              <p:nvPr/>
+            </p:nvCxnSpPr>
+            <p:spPr>
+              <a:xfrm>
+                <a:off x="9661396" y="131588"/>
+                <a:ext cx="70773" cy="76200"/>
+              </a:xfrm>
+              <a:prstGeom prst="line">
+                <a:avLst/>
+              </a:prstGeom>
+              <a:ln w="12700">
+                <a:solidFill>
+                  <a:srgbClr val="FFFFFF"/>
+                </a:solidFill>
+              </a:ln>
+            </p:spPr>
+            <p:style>
+              <a:lnRef idx="1">
+                <a:srgbClr val="4F81BD"/>
+              </a:lnRef>
+              <a:fillRef idx="0">
+                <a:srgbClr val="4F81BD"/>
+              </a:fillRef>
+              <a:effectRef idx="0">
+                <a:srgbClr val="4F81BD"/>
+              </a:effectRef>
+              <a:fontRef idx="minor">
+                <a:srgbClr val="000000"/>
+              </a:fontRef>
+            </p:style>
+          </p:cxnSp>
+          <p:cxnSp>
+            <p:nvCxnSpPr>
+              <p:cNvPr id="23" name="Line"/>
+              <p:cNvCxnSpPr/>
+              <p:nvPr/>
+            </p:nvCxnSpPr>
+            <p:spPr>
+              <a:xfrm flipH="1">
+                <a:off x="9661395" y="131588"/>
+                <a:ext cx="70773" cy="76200"/>
+              </a:xfrm>
+              <a:prstGeom prst="line">
+                <a:avLst/>
+              </a:prstGeom>
+              <a:ln w="12700">
+                <a:solidFill>
+                  <a:srgbClr val="FFFFFF"/>
+                </a:solidFill>
+              </a:ln>
+            </p:spPr>
+            <p:style>
+              <a:lnRef idx="1">
+                <a:srgbClr val="4F81BD"/>
+              </a:lnRef>
+              <a:fillRef idx="0">
+                <a:srgbClr val="4F81BD"/>
+              </a:fillRef>
+              <a:effectRef idx="0">
+                <a:srgbClr val="4F81BD"/>
+              </a:effectRef>
+              <a:fontRef idx="minor">
+                <a:srgbClr val="000000"/>
+              </a:fontRef>
+            </p:style>
+          </p:cxnSp>
+          <p:sp>
+            <p:nvSpPr>
+              <p:cNvPr id="24" name="Line"/>
+              <p:cNvSpPr/>
+              <p:nvPr/>
+            </p:nvSpPr>
+            <p:spPr>
+              <a:xfrm rot="10800000" flipV="1">
+                <a:off x="9499472" y="143255"/>
+                <a:ext cx="91440" cy="9144"/>
+              </a:xfrm>
+              <a:prstGeom prst="rect">
+                <a:avLst/>
+              </a:prstGeom>
+              <a:solidFill>
+                <a:srgbClr val="919191"/>
+              </a:solidFill>
+              <a:ln w="3175">
+                <a:solidFill>
+                  <a:srgbClr val="FFFFFF"/>
+                </a:solidFill>
+              </a:ln>
+            </p:spPr>
+            <p:style>
+              <a:lnRef idx="2">
+                <a:srgbClr val="4F81BD">
+                  <a:shade val="50000"/>
+                </a:srgbClr>
+              </a:lnRef>
+              <a:fillRef idx="1001">
+                <a:srgbClr val="000000"/>
+              </a:fillRef>
+              <a:effectRef idx="0">
+                <a:srgbClr val="4F81BD"/>
+              </a:effectRef>
+              <a:fontRef idx="minor">
+                <a:srgbClr val="000000"/>
+              </a:fontRef>
+            </p:style>
+            <p:txBody>
+              <a:bodyPr rtlCol="0" anchor="ctr"/>
+              <a:lstStyle/>
+              <a:p>
+                <a:pPr algn="ctr"/>
+                <a:endParaRPr lang="en-US" sz="1050" dirty="0">
+                  <a:solidFill>
+                    <a:prstClr val="white"/>
+                  </a:solidFill>
+                </a:endParaRPr>
+              </a:p>
+            </p:txBody>
+          </p:sp>
+          <p:sp>
+            <p:nvSpPr>
+              <p:cNvPr id="25" name="Line"/>
+              <p:cNvSpPr/>
+              <p:nvPr/>
+            </p:nvSpPr>
+            <p:spPr>
+              <a:xfrm rot="10800000" flipV="1">
+                <a:off x="9498658" y="135261"/>
+                <a:ext cx="91440" cy="72527"/>
+              </a:xfrm>
+              <a:prstGeom prst="rect">
+                <a:avLst/>
+              </a:prstGeom>
+              <a:noFill/>
+              <a:ln w="12700">
+                <a:solidFill>
+                  <a:srgbClr val="FFFFFF"/>
+                </a:solidFill>
+              </a:ln>
+            </p:spPr>
+            <p:style>
+              <a:lnRef idx="2">
+                <a:srgbClr val="4F81BD">
+                  <a:shade val="50000"/>
+                </a:srgbClr>
+              </a:lnRef>
+              <a:fillRef idx="1001">
+                <a:srgbClr val="000000"/>
+              </a:fillRef>
+              <a:effectRef idx="0">
+                <a:srgbClr val="4F81BD"/>
+              </a:effectRef>
+              <a:fontRef idx="minor">
+                <a:srgbClr val="000000"/>
+              </a:fontRef>
+            </p:style>
+            <p:txBody>
+              <a:bodyPr rtlCol="0" anchor="ctr"/>
+              <a:lstStyle/>
+              <a:p>
+                <a:pPr algn="ctr"/>
+                <a:endParaRPr lang="en-US" sz="1050" dirty="0">
+                  <a:solidFill>
+                    <a:prstClr val="white"/>
+                  </a:solidFill>
+                </a:endParaRPr>
+              </a:p>
+            </p:txBody>
+          </p:sp>
+          <p:sp>
+            <p:nvSpPr>
+              <p:cNvPr id="26" name="Line"/>
+              <p:cNvSpPr/>
+              <p:nvPr/>
+            </p:nvSpPr>
+            <p:spPr>
+              <a:xfrm rot="10800000" flipV="1">
+                <a:off x="9347642" y="200476"/>
+                <a:ext cx="91440" cy="9144"/>
+              </a:xfrm>
+              <a:prstGeom prst="rect">
+                <a:avLst/>
+              </a:prstGeom>
+              <a:solidFill>
+                <a:srgbClr val="919191"/>
+              </a:solidFill>
+              <a:ln w="3175">
+                <a:solidFill>
+                  <a:srgbClr val="FFFFFF"/>
+                </a:solidFill>
+              </a:ln>
+            </p:spPr>
+            <p:style>
+              <a:lnRef idx="2">
+                <a:srgbClr val="4F81BD">
+                  <a:shade val="50000"/>
+                </a:srgbClr>
+              </a:lnRef>
+              <a:fillRef idx="1001">
+                <a:srgbClr val="000000"/>
+              </a:fillRef>
+              <a:effectRef idx="0">
+                <a:srgbClr val="4F81BD"/>
+              </a:effectRef>
+              <a:fontRef idx="minor">
+                <a:srgbClr val="000000"/>
+              </a:fontRef>
+            </p:style>
+            <p:txBody>
+              <a:bodyPr rtlCol="0" anchor="ctr"/>
+              <a:lstStyle/>
+              <a:p>
+                <a:pPr algn="ctr"/>
+                <a:endParaRPr lang="en-US" sz="1050" dirty="0">
+                  <a:solidFill>
+                    <a:prstClr val="white"/>
+                  </a:solidFill>
+                </a:endParaRPr>
+              </a:p>
+            </p:txBody>
+          </p:sp>
+        </p:grpSp>
+        <p:sp>
+          <p:nvSpPr>
+            <p:cNvPr id="8" name="WebPageBody"/>
+            <p:cNvSpPr/>
+            <p:nvPr/>
+          </p:nvSpPr>
+          <p:spPr>
+            <a:xfrm>
+              <a:off x="76200" y="685159"/>
+              <a:ext cx="8991600" cy="6066801"/>
+            </a:xfrm>
+            <a:prstGeom prst="rect">
+              <a:avLst/>
+            </a:prstGeom>
+            <a:solidFill>
+              <a:sysClr val="window" lastClr="FFFFFF"/>
+            </a:solidFill>
+            <a:ln w="3175" cap="flat" cmpd="sng" algn="ctr">
+              <a:solidFill>
+                <a:srgbClr val="000000">
+                  <a:lumMod val="50000"/>
+                  <a:lumOff val="50000"/>
+                </a:srgbClr>
+              </a:solidFill>
+              <a:prstDash val="solid"/>
+            </a:ln>
+            <a:effectLst/>
+          </p:spPr>
+          <p:txBody>
+            <a:bodyPr rtlCol="0" anchor="ctr"/>
+            <a:lstStyle/>
+            <a:p>
+              <a:pPr algn="ctr"/>
+              <a:endParaRPr lang="en-US" sz="1050" kern="0">
+                <a:solidFill>
+                  <a:prstClr val="white"/>
+                </a:solidFill>
+                <a:latin typeface="Segoe UI"/>
+              </a:endParaRPr>
+            </a:p>
+          </p:txBody>
+        </p:sp>
+        <p:grpSp>
+          <p:nvGrpSpPr>
+            <p:cNvPr id="9" name="Group 8"/>
+            <p:cNvGrpSpPr/>
+            <p:nvPr/>
+          </p:nvGrpSpPr>
+          <p:grpSpPr>
+            <a:xfrm>
+              <a:off x="8386335" y="360579"/>
+              <a:ext cx="640645" cy="183940"/>
+              <a:chOff x="8303527" y="360579"/>
+              <a:chExt cx="640645" cy="183940"/>
+            </a:xfrm>
+          </p:grpSpPr>
+          <p:pic>
+            <p:nvPicPr>
+              <p:cNvPr id="19" name="Picture 2" descr="C:\Users\t-dantay\Documents\Placeholders\home.png"/>
+              <p:cNvPicPr>
+                <a:picLocks noChangeAspect="1" noChangeArrowheads="1"/>
+              </p:cNvPicPr>
+              <p:nvPr/>
+            </p:nvPicPr>
+            <p:blipFill>
+              <a:blip r:embed="rId25" cstate="print">
+                <a:extLst>
+                  <a:ext uri="{28A0092B-C50C-407E-A947-70E740481C1C}">
+                    <a14:useLocalDpi xmlns:a14="http://schemas.microsoft.com/office/drawing/2010/main" val="0"/>
+                  </a:ext>
+                </a:extLst>
+              </a:blip>
+              <a:srcRect/>
+              <a:stretch>
+                <a:fillRect/>
+              </a:stretch>
+            </p:blipFill>
+            <p:spPr bwMode="auto">
+              <a:xfrm>
+                <a:off x="8303527" y="361109"/>
+                <a:ext cx="185783" cy="182880"/>
+              </a:xfrm>
+              <a:prstGeom prst="rect">
+                <a:avLst/>
+              </a:prstGeom>
+              <a:noFill/>
+              <a:extLst>
+                <a:ext uri="{909E8E84-426E-40DD-AFC4-6F175D3DCCD1}">
+                  <a14:hiddenFill xmlns:a14="http://schemas.microsoft.com/office/drawing/2010/main">
+                    <a:solidFill>
+                      <a:srgbClr val="FFFFFF"/>
+                    </a:solidFill>
+                  </a14:hiddenFill>
+                </a:ext>
+              </a:extLst>
+            </p:spPr>
+          </p:pic>
+          <p:pic>
+            <p:nvPicPr>
+              <p:cNvPr id="20" name="Picture 2" descr="C:\Users\t-dantay\Documents\Placeholders\setting.png"/>
+              <p:cNvPicPr>
+                <a:picLocks noChangeAspect="1" noChangeArrowheads="1"/>
+              </p:cNvPicPr>
+              <p:nvPr/>
+            </p:nvPicPr>
+            <p:blipFill rotWithShape="1">
+              <a:blip r:embed="rId26" cstate="print">
+                <a:extLst>
+                  <a:ext uri="{28A0092B-C50C-407E-A947-70E740481C1C}">
+                    <a14:useLocalDpi xmlns:a14="http://schemas.microsoft.com/office/drawing/2010/main" val="0"/>
+                  </a:ext>
+                </a:extLst>
+              </a:blip>
+              <a:srcRect t="13480" r="35484"/>
+              <a:stretch/>
+            </p:blipFill>
+            <p:spPr bwMode="auto">
+              <a:xfrm>
+                <a:off x="8761292" y="360579"/>
+                <a:ext cx="182880" cy="183940"/>
+              </a:xfrm>
+              <a:prstGeom prst="rect">
+                <a:avLst/>
+              </a:prstGeom>
+              <a:noFill/>
+              <a:extLst>
+                <a:ext uri="{909E8E84-426E-40DD-AFC4-6F175D3DCCD1}">
+                  <a14:hiddenFill xmlns:a14="http://schemas.microsoft.com/office/drawing/2010/main">
+                    <a:solidFill>
+                      <a:srgbClr val="FFFFFF"/>
+                    </a:solidFill>
+                  </a14:hiddenFill>
+                </a:ext>
+              </a:extLst>
+            </p:spPr>
+          </p:pic>
+          <p:pic>
+            <p:nvPicPr>
+              <p:cNvPr id="21" name="Picture 2" descr="C:\Users\t-dantay\Documents\Placeholders\star.png"/>
+              <p:cNvPicPr>
+                <a:picLocks noChangeAspect="1" noChangeArrowheads="1"/>
+              </p:cNvPicPr>
+              <p:nvPr/>
+            </p:nvPicPr>
+            <p:blipFill>
+              <a:blip r:embed="rId27" cstate="print">
+                <a:extLst>
+                  <a:ext uri="{28A0092B-C50C-407E-A947-70E740481C1C}">
+                    <a14:useLocalDpi xmlns:a14="http://schemas.microsoft.com/office/drawing/2010/main" val="0"/>
+                  </a:ext>
+                </a:extLst>
+              </a:blip>
+              <a:srcRect/>
+              <a:stretch>
+                <a:fillRect/>
+              </a:stretch>
+            </p:blipFill>
+            <p:spPr bwMode="auto">
+              <a:xfrm>
+                <a:off x="8529364" y="361109"/>
+                <a:ext cx="191874" cy="182880"/>
+              </a:xfrm>
+              <a:prstGeom prst="rect">
+                <a:avLst/>
+              </a:prstGeom>
+              <a:noFill/>
+              <a:extLst>
+                <a:ext uri="{909E8E84-426E-40DD-AFC4-6F175D3DCCD1}">
+                  <a14:hiddenFill xmlns:a14="http://schemas.microsoft.com/office/drawing/2010/main">
+                    <a:solidFill>
+                      <a:srgbClr val="FFFFFF"/>
+                    </a:solidFill>
+                  </a14:hiddenFill>
+                </a:ext>
+              </a:extLst>
+            </p:spPr>
+          </p:pic>
+        </p:grpSp>
+        <p:grpSp>
+          <p:nvGrpSpPr>
+            <p:cNvPr id="10" name="Group 9"/>
+            <p:cNvGrpSpPr/>
+            <p:nvPr/>
+          </p:nvGrpSpPr>
+          <p:grpSpPr>
+            <a:xfrm>
+              <a:off x="901072" y="330776"/>
+              <a:ext cx="7142930" cy="228600"/>
+              <a:chOff x="901072" y="330776"/>
+              <a:chExt cx="7142930" cy="228600"/>
+            </a:xfrm>
+          </p:grpSpPr>
+          <p:sp>
+            <p:nvSpPr>
+              <p:cNvPr id="11" name="UrlBar"/>
+              <p:cNvSpPr/>
+              <p:nvPr/>
+            </p:nvSpPr>
+            <p:spPr>
+              <a:xfrm>
+                <a:off x="901072" y="330776"/>
+                <a:ext cx="7142930" cy="228600"/>
+              </a:xfrm>
+              <a:prstGeom prst="rect">
+                <a:avLst/>
+              </a:prstGeom>
+              <a:solidFill>
+                <a:sysClr val="window" lastClr="FFFFFF"/>
+              </a:solidFill>
+              <a:ln w="3175" cap="flat" cmpd="sng" algn="ctr">
+                <a:solidFill>
+                  <a:srgbClr val="000000">
+                    <a:lumMod val="50000"/>
+                    <a:lumOff val="50000"/>
+                  </a:srgbClr>
+                </a:solidFill>
+                <a:prstDash val="solid"/>
+              </a:ln>
+              <a:effectLst/>
+            </p:spPr>
+            <p:txBody>
+              <a:bodyPr rtlCol="0" anchor="ctr"/>
+              <a:lstStyle/>
+              <a:p>
+                <a:r>
+                  <a:rPr lang="en-US" sz="1200" kern="0" dirty="0" smtClean="0">
+                    <a:solidFill>
+                      <a:prstClr val="black">
+                        <a:lumMod val="75000"/>
+                        <a:lumOff val="25000"/>
+                      </a:prstClr>
+                    </a:solidFill>
+                    <a:latin typeface="Segoe UI"/>
+                  </a:rPr>
+                  <a:t>http://</a:t>
+                </a:r>
+                <a:r>
+                  <a:rPr lang="en-US" sz="1200" kern="0" dirty="0" smtClean="0">
+                    <a:solidFill>
+                      <a:prstClr val="black">
+                        <a:lumMod val="75000"/>
+                        <a:lumOff val="25000"/>
+                      </a:prstClr>
+                    </a:solidFill>
+                    <a:latin typeface="Segoe UI"/>
+                  </a:rPr>
+                  <a:t>www.innovation4austria.at/i4a/Dashboard</a:t>
+                </a:r>
+                <a:endParaRPr lang="en-US" sz="1200" kern="0" dirty="0">
+                  <a:solidFill>
+                    <a:prstClr val="black">
+                      <a:lumMod val="75000"/>
+                      <a:lumOff val="25000"/>
+                    </a:prstClr>
+                  </a:solidFill>
+                  <a:latin typeface="Segoe UI"/>
+                </a:endParaRPr>
+              </a:p>
+            </p:txBody>
+          </p:sp>
+          <p:grpSp>
+            <p:nvGrpSpPr>
+              <p:cNvPr id="12" name="Group 11"/>
+              <p:cNvGrpSpPr/>
+              <p:nvPr/>
+            </p:nvGrpSpPr>
+            <p:grpSpPr>
+              <a:xfrm>
+                <a:off x="7260350" y="363706"/>
+                <a:ext cx="744325" cy="182880"/>
+                <a:chOff x="7260350" y="363706"/>
+                <a:chExt cx="744325" cy="182880"/>
+              </a:xfrm>
+            </p:grpSpPr>
+            <p:pic>
+              <p:nvPicPr>
+                <p:cNvPr id="13" name="Search" descr="C:\Users\t-dantay\Documents\Placeholders\search.png"/>
+                <p:cNvPicPr>
+                  <a:picLocks noChangeAspect="1" noChangeArrowheads="1"/>
+                </p:cNvPicPr>
+                <p:nvPr/>
+              </p:nvPicPr>
+              <p:blipFill>
+                <a:blip r:embed="rId28" cstate="print">
+                  <a:extLst>
+                    <a:ext uri="{28A0092B-C50C-407E-A947-70E740481C1C}">
+                      <a14:useLocalDpi xmlns:a14="http://schemas.microsoft.com/office/drawing/2010/main" val="0"/>
+                    </a:ext>
+                  </a:extLst>
+                </a:blip>
+                <a:srcRect/>
+                <a:stretch>
+                  <a:fillRect/>
+                </a:stretch>
+              </p:blipFill>
+              <p:spPr bwMode="auto">
+                <a:xfrm flipH="1">
+                  <a:off x="7260350" y="363706"/>
+                  <a:ext cx="182880" cy="182880"/>
+                </a:xfrm>
+                <a:prstGeom prst="rect">
+                  <a:avLst/>
+                </a:prstGeom>
+                <a:noFill/>
+                <a:extLst>
+                  <a:ext uri="{909E8E84-426E-40DD-AFC4-6F175D3DCCD1}">
+                    <a14:hiddenFill xmlns:a14="http://schemas.microsoft.com/office/drawing/2010/main">
+                      <a:solidFill>
+                        <a:srgbClr val="FFFFFF"/>
+                      </a:solidFill>
+                    </a14:hiddenFill>
+                  </a:ext>
+                </a:extLst>
+              </p:spPr>
+            </p:pic>
+            <p:pic>
+              <p:nvPicPr>
+                <p:cNvPr id="14" name="Refresh" descr="C:\Users\t-dantay\Documents\First24\arrowrepeat1.png"/>
+                <p:cNvPicPr>
+                  <a:picLocks noChangeAspect="1" noChangeArrowheads="1"/>
+                </p:cNvPicPr>
+                <p:nvPr/>
+              </p:nvPicPr>
+              <p:blipFill>
+                <a:blip r:embed="rId29" cstate="print">
+                  <a:extLst>
+                    <a:ext uri="{28A0092B-C50C-407E-A947-70E740481C1C}">
+                      <a14:useLocalDpi xmlns:a14="http://schemas.microsoft.com/office/drawing/2010/main" val="0"/>
+                    </a:ext>
+                  </a:extLst>
+                </a:blip>
+                <a:srcRect/>
+                <a:stretch>
+                  <a:fillRect/>
+                </a:stretch>
+              </p:blipFill>
+              <p:spPr bwMode="auto">
+                <a:xfrm>
+                  <a:off x="7644400" y="363706"/>
+                  <a:ext cx="182880" cy="182880"/>
+                </a:xfrm>
+                <a:prstGeom prst="rect">
+                  <a:avLst/>
+                </a:prstGeom>
+                <a:noFill/>
+                <a:extLst>
+                  <a:ext uri="{909E8E84-426E-40DD-AFC4-6F175D3DCCD1}">
+                    <a14:hiddenFill xmlns:a14="http://schemas.microsoft.com/office/drawing/2010/main">
+                      <a:solidFill>
+                        <a:srgbClr val="FFFFFF"/>
+                      </a:solidFill>
+                    </a14:hiddenFill>
+                  </a:ext>
+                </a:extLst>
+              </p:spPr>
+            </p:pic>
+            <p:pic>
+              <p:nvPicPr>
+                <p:cNvPr id="15" name="Drop Down" descr="C:\Users\t-dantay\Documents\First24\arrowsimple1.png"/>
+                <p:cNvPicPr>
+                  <a:picLocks noChangeAspect="1" noChangeArrowheads="1"/>
+                </p:cNvPicPr>
+                <p:nvPr/>
+              </p:nvPicPr>
+              <p:blipFill>
+                <a:blip r:embed="rId30" cstate="print">
+                  <a:extLst>
+                    <a:ext uri="{28A0092B-C50C-407E-A947-70E740481C1C}">
+                      <a14:useLocalDpi xmlns:a14="http://schemas.microsoft.com/office/drawing/2010/main" val="0"/>
+                    </a:ext>
+                  </a:extLst>
+                </a:blip>
+                <a:srcRect/>
+                <a:stretch>
+                  <a:fillRect/>
+                </a:stretch>
+              </p:blipFill>
+              <p:spPr bwMode="auto">
+                <a:xfrm rot="5400000">
+                  <a:off x="7476150" y="409426"/>
+                  <a:ext cx="91440" cy="91440"/>
+                </a:xfrm>
+                <a:prstGeom prst="rect">
+                  <a:avLst/>
+                </a:prstGeom>
+                <a:noFill/>
+                <a:extLst>
+                  <a:ext uri="{909E8E84-426E-40DD-AFC4-6F175D3DCCD1}">
+                    <a14:hiddenFill xmlns:a14="http://schemas.microsoft.com/office/drawing/2010/main">
+                      <a:solidFill>
+                        <a:srgbClr val="FFFFFF"/>
+                      </a:solidFill>
+                    </a14:hiddenFill>
+                  </a:ext>
+                </a:extLst>
+              </p:spPr>
+            </p:pic>
+            <p:grpSp>
+              <p:nvGrpSpPr>
+                <p:cNvPr id="16" name="X"/>
+                <p:cNvGrpSpPr/>
+                <p:nvPr/>
+              </p:nvGrpSpPr>
+              <p:grpSpPr>
+                <a:xfrm>
+                  <a:off x="7913235" y="409426"/>
+                  <a:ext cx="91440" cy="91440"/>
+                  <a:chOff x="4687215" y="1739180"/>
+                  <a:chExt cx="91440" cy="91440"/>
+                </a:xfrm>
+              </p:grpSpPr>
+              <p:cxnSp>
+                <p:nvCxnSpPr>
+                  <p:cNvPr id="17" name="Straight Connector 16"/>
+                  <p:cNvCxnSpPr/>
+                  <p:nvPr/>
+                </p:nvCxnSpPr>
+                <p:spPr>
+                  <a:xfrm flipV="1">
+                    <a:off x="4687215" y="1739180"/>
+                    <a:ext cx="91440" cy="91440"/>
+                  </a:xfrm>
+                  <a:prstGeom prst="line">
+                    <a:avLst/>
+                  </a:prstGeom>
+                  <a:ln w="28575">
+                    <a:solidFill>
+                      <a:srgbClr val="FFFFFF">
+                        <a:lumMod val="50000"/>
+                      </a:srgbClr>
+                    </a:solidFill>
+                  </a:ln>
+                </p:spPr>
+                <p:style>
+                  <a:lnRef idx="1">
+                    <a:srgbClr val="FFFFFF"/>
+                  </a:lnRef>
+                  <a:fillRef idx="0">
+                    <a:srgbClr val="FFFFFF"/>
+                  </a:fillRef>
+                  <a:effectRef idx="0">
+                    <a:srgbClr val="FFFFFF"/>
+                  </a:effectRef>
+                  <a:fontRef idx="minor">
+                    <a:srgbClr val="000000"/>
+                  </a:fontRef>
+                </p:style>
+              </p:cxnSp>
+              <p:cxnSp>
+                <p:nvCxnSpPr>
+                  <p:cNvPr id="18" name="Straight Connector 17"/>
+                  <p:cNvCxnSpPr/>
+                  <p:nvPr/>
+                </p:nvCxnSpPr>
+                <p:spPr>
+                  <a:xfrm>
+                    <a:off x="4687215" y="1739180"/>
+                    <a:ext cx="91440" cy="91440"/>
+                  </a:xfrm>
+                  <a:prstGeom prst="line">
+                    <a:avLst/>
+                  </a:prstGeom>
+                  <a:ln w="28575">
+                    <a:solidFill>
+                      <a:srgbClr val="FFFFFF">
+                        <a:lumMod val="50000"/>
+                      </a:srgbClr>
+                    </a:solidFill>
+                  </a:ln>
+                </p:spPr>
+                <p:style>
+                  <a:lnRef idx="1">
+                    <a:srgbClr val="FFFFFF"/>
+                  </a:lnRef>
+                  <a:fillRef idx="0">
+                    <a:srgbClr val="FFFFFF"/>
+                  </a:fillRef>
+                  <a:effectRef idx="0">
+                    <a:srgbClr val="FFFFFF"/>
+                  </a:effectRef>
+                  <a:fontRef idx="minor">
+                    <a:srgbClr val="000000"/>
+                  </a:fontRef>
+                </p:style>
+              </p:cxnSp>
+            </p:grpSp>
+          </p:grpSp>
+        </p:grpSp>
+      </p:grpSp>
+      <p:sp>
+        <p:nvSpPr>
+          <p:cNvPr id="31" name="Content"/>
+          <p:cNvSpPr/>
+          <p:nvPr>
+            <p:custDataLst>
+              <p:custData r:id="rId2"/>
+            </p:custDataLst>
+          </p:nvPr>
+        </p:nvSpPr>
+        <p:spPr>
+          <a:xfrm>
+            <a:off x="1628775" y="696046"/>
+            <a:ext cx="8991600" cy="462125"/>
+          </a:xfrm>
+          <a:prstGeom prst="rect">
+            <a:avLst/>
+          </a:prstGeom>
+          <a:solidFill>
+            <a:srgbClr val="FFFFFF">
+              <a:lumMod val="95000"/>
+            </a:srgbClr>
+          </a:solidFill>
+          <a:ln w="3175" cap="flat" cmpd="sng" algn="ctr">
+            <a:solidFill>
+              <a:srgbClr val="FFFFFF">
+                <a:lumMod val="50000"/>
+              </a:srgbClr>
+            </a:solidFill>
+            <a:prstDash val="solid"/>
+          </a:ln>
+          <a:effectLst/>
+        </p:spPr>
+        <p:txBody>
+          <a:bodyPr rot="0" spcFirstLastPara="0" vertOverflow="overflow" horzOverflow="overflow" vert="horz" wrap="square" lIns="45720" tIns="45720" rIns="91440" bIns="45720" numCol="1" spcCol="0" rtlCol="0" fromWordArt="0" anchor="ctr" anchorCtr="0" forceAA="0" compatLnSpc="1">
+            <a:prstTxWarp prst="textNoShape">
+              <a:avLst/>
+            </a:prstTxWarp>
+            <a:noAutofit/>
+          </a:bodyPr>
+          <a:lstStyle/>
+          <a:p>
+            <a:pPr marL="0" marR="0" indent="0" defTabSz="914400" eaLnBrk="1" fontAlgn="auto" latinLnBrk="0" hangingPunct="1">
+              <a:lnSpc>
+                <a:spcPct val="100000"/>
+              </a:lnSpc>
+              <a:spcBef>
+                <a:spcPts val="0"/>
+              </a:spcBef>
+              <a:spcAft>
+                <a:spcPts val="0"/>
+              </a:spcAft>
+              <a:buClrTx/>
+              <a:buSzTx/>
+              <a:buFontTx/>
+              <a:buNone/>
+              <a:tabLst/>
+            </a:pPr>
+            <a:r>
+              <a:rPr lang="en-US" sz="1200" kern="0" dirty="0">
+                <a:solidFill>
+                  <a:srgbClr val="000000">
+                    <a:lumMod val="75000"/>
+                    <a:lumOff val="25000"/>
+                  </a:srgbClr>
+                </a:solidFill>
+                <a:latin typeface="Segoe UI"/>
+              </a:rPr>
+              <a:t> </a:t>
+            </a:r>
+            <a:r>
+              <a:rPr lang="en-US" sz="1200" kern="0" dirty="0" smtClean="0">
+                <a:solidFill>
+                  <a:srgbClr val="000000">
+                    <a:lumMod val="75000"/>
+                    <a:lumOff val="25000"/>
+                  </a:srgbClr>
+                </a:solidFill>
+                <a:latin typeface="Segoe UI"/>
+              </a:rPr>
+              <a:t> </a:t>
+            </a:r>
+            <a:r>
+              <a:rPr lang="en-US" sz="1200" kern="0" spc="300" dirty="0" smtClean="0">
+                <a:solidFill>
+                  <a:srgbClr val="000000">
+                    <a:lumMod val="75000"/>
+                    <a:lumOff val="25000"/>
+                  </a:srgbClr>
+                </a:solidFill>
+                <a:latin typeface="Segoe UI"/>
+              </a:rPr>
+              <a:t>INNOVATION4AUSTRIA </a:t>
+            </a:r>
+            <a:r>
+              <a:rPr lang="en-US" sz="1200" kern="0" spc="300" dirty="0" err="1" smtClean="0">
+                <a:solidFill>
+                  <a:srgbClr val="000000">
+                    <a:lumMod val="75000"/>
+                    <a:lumOff val="25000"/>
+                  </a:srgbClr>
+                </a:solidFill>
+                <a:latin typeface="Segoe UI"/>
+              </a:rPr>
+              <a:t>Mitarbeiter</a:t>
+            </a:r>
+            <a:endParaRPr kumimoji="0" lang="en-US" sz="1200" b="0" i="0" u="none" strike="noStrike" kern="0" cap="none" spc="300" normalizeH="0" baseline="0" noProof="0" dirty="0" smtClean="0">
+              <a:ln>
+                <a:noFill/>
+              </a:ln>
+              <a:solidFill>
+                <a:srgbClr val="000000">
+                  <a:lumMod val="75000"/>
+                  <a:lumOff val="25000"/>
+                </a:srgbClr>
+              </a:solidFill>
+              <a:effectLst/>
+              <a:uLnTx/>
+              <a:uFillTx/>
+              <a:latin typeface="Segoe UI"/>
+            </a:endParaRPr>
+          </a:p>
+        </p:txBody>
+      </p:sp>
+      <p:sp>
+        <p:nvSpPr>
+          <p:cNvPr id="32" name="Content"/>
+          <p:cNvSpPr txBox="1"/>
+          <p:nvPr>
+            <p:custDataLst>
+              <p:custData r:id="rId3"/>
+            </p:custDataLst>
+          </p:nvPr>
+        </p:nvSpPr>
+        <p:spPr>
+          <a:xfrm>
+            <a:off x="9972653" y="811692"/>
+            <a:ext cx="667170" cy="230832"/>
+          </a:xfrm>
+          <a:prstGeom prst="rect">
+            <a:avLst/>
+          </a:prstGeom>
+          <a:noFill/>
+        </p:spPr>
+        <p:txBody>
+          <a:bodyPr wrap="none" lIns="91440" tIns="18288" rIns="91440" bIns="27432" rtlCol="0" anchor="ctr" anchorCtr="0">
+            <a:spAutoFit/>
+          </a:bodyPr>
+          <a:lstStyle/>
+          <a:p>
+            <a:r>
+              <a:rPr lang="en-US" sz="1200" dirty="0" smtClean="0">
+                <a:solidFill>
+                  <a:srgbClr val="000000"/>
+                </a:solidFill>
+                <a:latin typeface="Segoe UI" pitchFamily="34" charset="0"/>
+                <a:ea typeface="Segoe UI" pitchFamily="34" charset="0"/>
+                <a:cs typeface="Segoe UI" pitchFamily="34" charset="0"/>
+              </a:rPr>
+              <a:t>Logout</a:t>
+            </a:r>
+          </a:p>
+        </p:txBody>
+      </p:sp>
+      <p:pic>
+        <p:nvPicPr>
+          <p:cNvPr id="33" name="Picture 2" descr="C:\Users\t-dantay\Documents\Placeholders\user.png"/>
+          <p:cNvPicPr>
+            <a:picLocks noChangeAspect="1" noChangeArrowheads="1"/>
+          </p:cNvPicPr>
+          <p:nvPr>
+            <p:custDataLst>
+              <p:custData r:id="rId4"/>
+            </p:custDataLst>
+          </p:nvPr>
+        </p:nvPicPr>
+        <p:blipFill>
+          <a:blip r:embed="rId31" cstate="print">
+            <a:extLst>
+              <a:ext uri="{28A0092B-C50C-407E-A947-70E740481C1C}">
+                <a14:useLocalDpi xmlns:a14="http://schemas.microsoft.com/office/drawing/2010/main" val="0"/>
+              </a:ext>
+            </a:extLst>
+          </a:blip>
+          <a:srcRect/>
+          <a:stretch>
+            <a:fillRect/>
+          </a:stretch>
+        </p:blipFill>
+        <p:spPr bwMode="auto">
+          <a:xfrm>
+            <a:off x="9753872" y="809625"/>
+            <a:ext cx="209006" cy="228600"/>
+          </a:xfrm>
+          <a:prstGeom prst="rect">
+            <a:avLst/>
+          </a:prstGeom>
+          <a:noFill/>
+          <a:extLst>
+            <a:ext uri="{909E8E84-426E-40DD-AFC4-6F175D3DCCD1}">
+              <a14:hiddenFill xmlns:a14="http://schemas.microsoft.com/office/drawing/2010/main">
+                <a:solidFill>
+                  <a:srgbClr val="FFFFFF"/>
+                </a:solidFill>
+              </a14:hiddenFill>
+            </a:ext>
+          </a:extLst>
+        </p:spPr>
+      </p:pic>
+      <p:sp>
+        <p:nvSpPr>
+          <p:cNvPr id="35" name="Content"/>
+          <p:cNvSpPr txBox="1"/>
+          <p:nvPr>
+            <p:custDataLst>
+              <p:custData r:id="rId5"/>
+            </p:custDataLst>
+          </p:nvPr>
+        </p:nvSpPr>
+        <p:spPr>
+          <a:xfrm>
+            <a:off x="3399990" y="1843330"/>
+            <a:ext cx="1152110" cy="292388"/>
+          </a:xfrm>
+          <a:prstGeom prst="rect">
+            <a:avLst/>
+          </a:prstGeom>
+          <a:noFill/>
+        </p:spPr>
+        <p:txBody>
+          <a:bodyPr wrap="none" lIns="91440" tIns="18288" rIns="91440" bIns="27432" rtlCol="0" anchor="ctr" anchorCtr="0">
+            <a:spAutoFit/>
+          </a:bodyPr>
+          <a:lstStyle/>
+          <a:p>
+            <a:r>
+              <a:rPr lang="en-US" sz="1600" b="1" dirty="0" err="1" smtClean="0">
+                <a:solidFill>
+                  <a:srgbClr val="000000"/>
+                </a:solidFill>
+                <a:latin typeface="Segoe UI" pitchFamily="34" charset="0"/>
+                <a:ea typeface="Segoe UI" pitchFamily="34" charset="0"/>
+                <a:cs typeface="Segoe UI" pitchFamily="34" charset="0"/>
+              </a:rPr>
+              <a:t>Verwalten</a:t>
+            </a:r>
+            <a:endParaRPr lang="en-US" sz="1600" b="1" dirty="0" smtClean="0">
+              <a:solidFill>
+                <a:srgbClr val="000000"/>
+              </a:solidFill>
+              <a:latin typeface="Segoe UI" pitchFamily="34" charset="0"/>
+              <a:ea typeface="Segoe UI" pitchFamily="34" charset="0"/>
+              <a:cs typeface="Segoe UI" pitchFamily="34" charset="0"/>
+            </a:endParaRPr>
+          </a:p>
+        </p:txBody>
+      </p:sp>
+      <p:sp>
+        <p:nvSpPr>
+          <p:cNvPr id="36" name="Content"/>
+          <p:cNvSpPr txBox="1"/>
+          <p:nvPr>
+            <p:custDataLst>
+              <p:custData r:id="rId6"/>
+            </p:custDataLst>
+          </p:nvPr>
+        </p:nvSpPr>
+        <p:spPr>
+          <a:xfrm>
+            <a:off x="5698817" y="1358424"/>
+            <a:ext cx="960519" cy="292388"/>
+          </a:xfrm>
+          <a:prstGeom prst="rect">
+            <a:avLst/>
+          </a:prstGeom>
+          <a:noFill/>
+        </p:spPr>
+        <p:txBody>
+          <a:bodyPr wrap="none" lIns="91440" tIns="18288" rIns="91440" bIns="27432" rtlCol="0" anchor="ctr" anchorCtr="0">
+            <a:spAutoFit/>
+          </a:bodyPr>
+          <a:lstStyle/>
+          <a:p>
+            <a:r>
+              <a:rPr lang="en-US" sz="1600" b="1" dirty="0" smtClean="0">
+                <a:solidFill>
+                  <a:srgbClr val="000000"/>
+                </a:solidFill>
+                <a:latin typeface="Segoe UI" pitchFamily="34" charset="0"/>
+                <a:ea typeface="Segoe UI" pitchFamily="34" charset="0"/>
+                <a:cs typeface="Segoe UI" pitchFamily="34" charset="0"/>
+              </a:rPr>
+              <a:t>FIRMEN</a:t>
+            </a:r>
+            <a:endParaRPr lang="en-US" sz="1600" b="1" dirty="0" smtClean="0">
+              <a:solidFill>
+                <a:srgbClr val="000000"/>
+              </a:solidFill>
+              <a:latin typeface="Segoe UI" pitchFamily="34" charset="0"/>
+              <a:ea typeface="Segoe UI" pitchFamily="34" charset="0"/>
+              <a:cs typeface="Segoe UI" pitchFamily="34" charset="0"/>
+            </a:endParaRPr>
+          </a:p>
+        </p:txBody>
+      </p:sp>
+      <p:sp>
+        <p:nvSpPr>
+          <p:cNvPr id="37" name="Content"/>
+          <p:cNvSpPr txBox="1"/>
+          <p:nvPr>
+            <p:custDataLst>
+              <p:custData r:id="rId7"/>
+            </p:custDataLst>
+          </p:nvPr>
+        </p:nvSpPr>
+        <p:spPr>
+          <a:xfrm>
+            <a:off x="7876435" y="1843330"/>
+            <a:ext cx="1005788" cy="292388"/>
+          </a:xfrm>
+          <a:prstGeom prst="rect">
+            <a:avLst/>
+          </a:prstGeom>
+          <a:noFill/>
+        </p:spPr>
+        <p:txBody>
+          <a:bodyPr wrap="none" lIns="91440" tIns="18288" rIns="91440" bIns="27432" rtlCol="0" anchor="ctr" anchorCtr="0">
+            <a:spAutoFit/>
+          </a:bodyPr>
+          <a:lstStyle/>
+          <a:p>
+            <a:r>
+              <a:rPr lang="en-US" sz="1600" b="1" dirty="0" err="1" smtClean="0">
+                <a:solidFill>
+                  <a:srgbClr val="000000"/>
+                </a:solidFill>
+                <a:latin typeface="Segoe UI" pitchFamily="34" charset="0"/>
+                <a:ea typeface="Segoe UI" pitchFamily="34" charset="0"/>
+                <a:cs typeface="Segoe UI" pitchFamily="34" charset="0"/>
+              </a:rPr>
+              <a:t>Erstellen</a:t>
+            </a:r>
+            <a:endParaRPr lang="en-US" sz="1600" b="1" dirty="0" smtClean="0">
+              <a:solidFill>
+                <a:srgbClr val="000000"/>
+              </a:solidFill>
+              <a:latin typeface="Segoe UI" pitchFamily="34" charset="0"/>
+              <a:ea typeface="Segoe UI" pitchFamily="34" charset="0"/>
+              <a:cs typeface="Segoe UI" pitchFamily="34" charset="0"/>
+            </a:endParaRPr>
+          </a:p>
+        </p:txBody>
+      </p:sp>
+      <p:sp>
+        <p:nvSpPr>
+          <p:cNvPr id="93" name="Tile"/>
+          <p:cNvSpPr/>
+          <p:nvPr/>
+        </p:nvSpPr>
+        <p:spPr>
+          <a:xfrm>
+            <a:off x="2724251" y="2337089"/>
+            <a:ext cx="2410782" cy="2175746"/>
+          </a:xfrm>
+          <a:prstGeom prst="rect">
+            <a:avLst/>
+          </a:prstGeom>
+          <a:solidFill>
+            <a:srgbClr val="FFFFFF">
+              <a:lumMod val="85000"/>
+            </a:srgbClr>
+          </a:solidFill>
+          <a:ln w="28575">
+            <a:noFill/>
+          </a:ln>
+        </p:spPr>
+        <p:style>
+          <a:lnRef idx="2">
+            <a:srgbClr val="4F81BD">
+              <a:shade val="50000"/>
+            </a:srgbClr>
+          </a:lnRef>
+          <a:fillRef idx="1">
+            <a:srgbClr val="4F81BD"/>
+          </a:fillRef>
+          <a:effectRef idx="0">
+            <a:srgbClr val="4F81BD"/>
+          </a:effectRef>
+          <a:fontRef idx="minor">
+            <a:srgbClr val="000000"/>
+          </a:fontRef>
+        </p:style>
+        <p:txBody>
+          <a:bodyPr rtlCol="0" anchor="t" anchorCtr="0"/>
+          <a:lstStyle/>
+          <a:p>
+            <a:r>
+              <a:rPr lang="en-US" sz="1400" dirty="0" smtClean="0"/>
+              <a:t>Name: 	Firma1</a:t>
+            </a:r>
+          </a:p>
+          <a:p>
+            <a:pPr>
+              <a:tabLst>
+                <a:tab pos="896938" algn="l"/>
+              </a:tabLst>
+            </a:pPr>
+            <a:r>
+              <a:rPr lang="en-US" sz="1400" dirty="0"/>
+              <a:t/>
+            </a:r>
+            <a:br>
+              <a:rPr lang="en-US" sz="1400" dirty="0"/>
+            </a:br>
+            <a:r>
+              <a:rPr lang="en-US" sz="1400" dirty="0" smtClean="0"/>
+              <a:t>PLZ:	1030</a:t>
+            </a:r>
+            <a:br>
+              <a:rPr lang="en-US" sz="1400" dirty="0" smtClean="0"/>
+            </a:br>
+            <a:r>
+              <a:rPr lang="en-US" sz="1400" dirty="0" smtClean="0"/>
+              <a:t>Ort:	Wien</a:t>
+            </a:r>
+          </a:p>
+          <a:p>
+            <a:r>
+              <a:rPr lang="en-US" sz="1400" dirty="0" err="1" smtClean="0"/>
+              <a:t>Straße</a:t>
+            </a:r>
+            <a:r>
+              <a:rPr lang="en-US" sz="1400" dirty="0" smtClean="0"/>
+              <a:t>:	</a:t>
+            </a:r>
+            <a:r>
+              <a:rPr lang="en-US" sz="1400" dirty="0" err="1" smtClean="0"/>
+              <a:t>Musterstraße</a:t>
+            </a:r>
+            <a:endParaRPr lang="en-US" sz="1400" dirty="0" smtClean="0"/>
+          </a:p>
+          <a:p>
+            <a:r>
+              <a:rPr lang="en-US" sz="1400" dirty="0" err="1" smtClean="0"/>
+              <a:t>Nr</a:t>
+            </a:r>
+            <a:r>
+              <a:rPr lang="en-US" sz="1400" dirty="0" smtClean="0"/>
+              <a:t>.:	1</a:t>
+            </a:r>
+            <a:endParaRPr lang="en-US" sz="1400" dirty="0"/>
+          </a:p>
+        </p:txBody>
+      </p:sp>
+      <p:sp>
+        <p:nvSpPr>
+          <p:cNvPr id="75" name="Content"/>
+          <p:cNvSpPr/>
+          <p:nvPr>
+            <p:custDataLst>
+              <p:custData r:id="rId8"/>
+            </p:custDataLst>
+          </p:nvPr>
+        </p:nvSpPr>
+        <p:spPr>
+          <a:xfrm>
+            <a:off x="2904279" y="3788934"/>
+            <a:ext cx="896196" cy="228600"/>
+          </a:xfrm>
+          <a:prstGeom prst="roundRect">
+            <a:avLst/>
+          </a:prstGeom>
+          <a:solidFill>
+            <a:schemeClr val="accent4">
+              <a:lumMod val="40000"/>
+              <a:lumOff val="60000"/>
+            </a:schemeClr>
+          </a:solidFill>
+          <a:ln w="3175">
+            <a:solidFill>
+              <a:srgbClr val="000000">
+                <a:lumMod val="50000"/>
+                <a:lumOff val="50000"/>
+              </a:srgbClr>
+            </a:solidFill>
+          </a:ln>
+          <a:effectLst/>
+        </p:spPr>
+        <p:style>
+          <a:lnRef idx="2">
+            <a:srgbClr val="4F81BD">
+              <a:shade val="50000"/>
+            </a:srgbClr>
+          </a:lnRef>
+          <a:fillRef idx="1">
+            <a:srgbClr val="4F81BD"/>
+          </a:fillRef>
+          <a:effectRef idx="0">
+            <a:srgbClr val="4F81BD"/>
+          </a:effectRef>
+          <a:fontRef idx="minor">
+            <a:srgbClr val="000000"/>
+          </a:fontRef>
+        </p:style>
+        <p:txBody>
+          <a:bodyPr wrap="square" lIns="91440" tIns="0" rIns="91440" bIns="9144" rtlCol="0" anchor="ctr">
+            <a:noAutofit/>
+          </a:bodyPr>
+          <a:lstStyle/>
+          <a:p>
+            <a:pPr algn="ctr"/>
+            <a:r>
+              <a:rPr lang="en-US" sz="1200" dirty="0" err="1" smtClean="0">
+                <a:solidFill>
+                  <a:srgbClr val="000000"/>
+                </a:solidFill>
+                <a:latin typeface="Segoe UI" pitchFamily="34" charset="0"/>
+                <a:cs typeface="Segoe UI" pitchFamily="34" charset="0"/>
+              </a:rPr>
+              <a:t>ändern</a:t>
+            </a:r>
+            <a:endParaRPr lang="en-US" sz="1200" dirty="0">
+              <a:solidFill>
+                <a:srgbClr val="000000"/>
+              </a:solidFill>
+              <a:latin typeface="Segoe UI" pitchFamily="34" charset="0"/>
+              <a:cs typeface="Segoe UI" pitchFamily="34" charset="0"/>
+            </a:endParaRPr>
+          </a:p>
+        </p:txBody>
+      </p:sp>
+      <p:sp>
+        <p:nvSpPr>
+          <p:cNvPr id="76" name="Content"/>
+          <p:cNvSpPr/>
+          <p:nvPr>
+            <p:custDataLst>
+              <p:custData r:id="rId9"/>
+            </p:custDataLst>
+          </p:nvPr>
+        </p:nvSpPr>
+        <p:spPr>
+          <a:xfrm>
+            <a:off x="4019656" y="3800417"/>
+            <a:ext cx="896196" cy="228600"/>
+          </a:xfrm>
+          <a:prstGeom prst="roundRect">
+            <a:avLst/>
+          </a:prstGeom>
+          <a:solidFill>
+            <a:schemeClr val="accent2">
+              <a:lumMod val="60000"/>
+              <a:lumOff val="40000"/>
+            </a:schemeClr>
+          </a:solidFill>
+          <a:ln w="3175">
+            <a:solidFill>
+              <a:srgbClr val="000000">
+                <a:lumMod val="50000"/>
+                <a:lumOff val="50000"/>
+              </a:srgbClr>
+            </a:solidFill>
+          </a:ln>
+          <a:effectLst/>
+        </p:spPr>
+        <p:style>
+          <a:lnRef idx="2">
+            <a:srgbClr val="4F81BD">
+              <a:shade val="50000"/>
+            </a:srgbClr>
+          </a:lnRef>
+          <a:fillRef idx="1">
+            <a:srgbClr val="4F81BD"/>
+          </a:fillRef>
+          <a:effectRef idx="0">
+            <a:srgbClr val="4F81BD"/>
+          </a:effectRef>
+          <a:fontRef idx="minor">
+            <a:srgbClr val="000000"/>
+          </a:fontRef>
+        </p:style>
+        <p:txBody>
+          <a:bodyPr wrap="square" lIns="91440" tIns="0" rIns="91440" bIns="9144" rtlCol="0" anchor="ctr">
+            <a:noAutofit/>
+          </a:bodyPr>
+          <a:lstStyle/>
+          <a:p>
+            <a:pPr algn="ctr"/>
+            <a:r>
+              <a:rPr lang="en-US" sz="1200" dirty="0" err="1" smtClean="0">
+                <a:solidFill>
+                  <a:srgbClr val="000000"/>
+                </a:solidFill>
+                <a:latin typeface="Segoe UI" pitchFamily="34" charset="0"/>
+                <a:cs typeface="Segoe UI" pitchFamily="34" charset="0"/>
+              </a:rPr>
+              <a:t>löschen</a:t>
+            </a:r>
+            <a:endParaRPr lang="en-US" sz="1200" dirty="0">
+              <a:solidFill>
+                <a:srgbClr val="000000"/>
+              </a:solidFill>
+              <a:latin typeface="Segoe UI" pitchFamily="34" charset="0"/>
+              <a:cs typeface="Segoe UI" pitchFamily="34" charset="0"/>
+            </a:endParaRPr>
+          </a:p>
+        </p:txBody>
+      </p:sp>
+      <p:sp>
+        <p:nvSpPr>
+          <p:cNvPr id="77" name="Content"/>
+          <p:cNvSpPr/>
+          <p:nvPr>
+            <p:custDataLst>
+              <p:custData r:id="rId10"/>
+            </p:custDataLst>
+          </p:nvPr>
+        </p:nvSpPr>
+        <p:spPr>
+          <a:xfrm>
+            <a:off x="3481544" y="4141650"/>
+            <a:ext cx="896196" cy="228600"/>
+          </a:xfrm>
+          <a:prstGeom prst="roundRect">
+            <a:avLst/>
+          </a:prstGeom>
+          <a:solidFill>
+            <a:srgbClr val="FFFFFF">
+              <a:lumMod val="95000"/>
+            </a:srgbClr>
+          </a:solidFill>
+          <a:ln w="3175">
+            <a:solidFill>
+              <a:srgbClr val="000000">
+                <a:lumMod val="50000"/>
+                <a:lumOff val="50000"/>
+              </a:srgbClr>
+            </a:solidFill>
+          </a:ln>
+          <a:effectLst/>
+        </p:spPr>
+        <p:style>
+          <a:lnRef idx="2">
+            <a:srgbClr val="4F81BD">
+              <a:shade val="50000"/>
+            </a:srgbClr>
+          </a:lnRef>
+          <a:fillRef idx="1">
+            <a:srgbClr val="4F81BD"/>
+          </a:fillRef>
+          <a:effectRef idx="0">
+            <a:srgbClr val="4F81BD"/>
+          </a:effectRef>
+          <a:fontRef idx="minor">
+            <a:srgbClr val="000000"/>
+          </a:fontRef>
+        </p:style>
+        <p:txBody>
+          <a:bodyPr wrap="square" lIns="91440" tIns="0" rIns="91440" bIns="9144" rtlCol="0" anchor="ctr">
+            <a:noAutofit/>
+          </a:bodyPr>
+          <a:lstStyle/>
+          <a:p>
+            <a:pPr algn="ctr"/>
+            <a:r>
+              <a:rPr lang="en-US" sz="1200" dirty="0" err="1" smtClean="0">
+                <a:solidFill>
+                  <a:srgbClr val="000000"/>
+                </a:solidFill>
+                <a:latin typeface="Segoe UI" pitchFamily="34" charset="0"/>
+                <a:cs typeface="Segoe UI" pitchFamily="34" charset="0"/>
+              </a:rPr>
+              <a:t>Räume</a:t>
+            </a:r>
+            <a:r>
+              <a:rPr lang="en-US" sz="1200" dirty="0" smtClean="0">
+                <a:solidFill>
+                  <a:srgbClr val="000000"/>
+                </a:solidFill>
+                <a:latin typeface="Segoe UI" pitchFamily="34" charset="0"/>
+                <a:cs typeface="Segoe UI" pitchFamily="34" charset="0"/>
+              </a:rPr>
+              <a:t>…</a:t>
+            </a:r>
+            <a:endParaRPr lang="en-US" sz="1200" dirty="0">
+              <a:solidFill>
+                <a:srgbClr val="000000"/>
+              </a:solidFill>
+              <a:latin typeface="Segoe UI" pitchFamily="34" charset="0"/>
+              <a:cs typeface="Segoe UI" pitchFamily="34" charset="0"/>
+            </a:endParaRPr>
+          </a:p>
+        </p:txBody>
+      </p:sp>
+      <p:sp>
+        <p:nvSpPr>
+          <p:cNvPr id="78" name="Tile"/>
+          <p:cNvSpPr/>
+          <p:nvPr/>
+        </p:nvSpPr>
+        <p:spPr>
+          <a:xfrm>
+            <a:off x="2724251" y="4727770"/>
+            <a:ext cx="2410782" cy="2006772"/>
+          </a:xfrm>
+          <a:prstGeom prst="rect">
+            <a:avLst/>
+          </a:prstGeom>
+          <a:solidFill>
+            <a:srgbClr val="FFFFFF">
+              <a:lumMod val="85000"/>
+            </a:srgbClr>
+          </a:solidFill>
+          <a:ln w="28575">
+            <a:noFill/>
+          </a:ln>
+        </p:spPr>
+        <p:style>
+          <a:lnRef idx="2">
+            <a:srgbClr val="4F81BD">
+              <a:shade val="50000"/>
+            </a:srgbClr>
+          </a:lnRef>
+          <a:fillRef idx="1">
+            <a:srgbClr val="4F81BD"/>
+          </a:fillRef>
+          <a:effectRef idx="0">
+            <a:srgbClr val="4F81BD"/>
+          </a:effectRef>
+          <a:fontRef idx="minor">
+            <a:srgbClr val="000000"/>
+          </a:fontRef>
+        </p:style>
+        <p:txBody>
+          <a:bodyPr rtlCol="0" anchor="t" anchorCtr="0"/>
+          <a:lstStyle/>
+          <a:p>
+            <a:r>
+              <a:rPr lang="en-US" sz="1400" dirty="0" smtClean="0"/>
+              <a:t>Name: 	Firma2</a:t>
+            </a:r>
+          </a:p>
+          <a:p>
+            <a:pPr>
+              <a:tabLst>
+                <a:tab pos="896938" algn="l"/>
+              </a:tabLst>
+            </a:pPr>
+            <a:r>
+              <a:rPr lang="en-US" sz="1400" dirty="0"/>
+              <a:t/>
+            </a:r>
+            <a:br>
+              <a:rPr lang="en-US" sz="1400" dirty="0"/>
+            </a:br>
+            <a:r>
+              <a:rPr lang="en-US" sz="1400" dirty="0" smtClean="0"/>
+              <a:t>PLZ:	1110</a:t>
+            </a:r>
+            <a:br>
+              <a:rPr lang="en-US" sz="1400" dirty="0" smtClean="0"/>
+            </a:br>
+            <a:r>
+              <a:rPr lang="en-US" sz="1400" dirty="0" smtClean="0"/>
+              <a:t>Ort:	Wien</a:t>
+            </a:r>
+          </a:p>
+          <a:p>
+            <a:r>
+              <a:rPr lang="en-US" sz="1400" dirty="0" err="1" smtClean="0"/>
+              <a:t>Straße</a:t>
+            </a:r>
+            <a:r>
+              <a:rPr lang="en-US" sz="1400" dirty="0" smtClean="0"/>
+              <a:t>:	</a:t>
+            </a:r>
+            <a:r>
+              <a:rPr lang="en-US" sz="1400" dirty="0" err="1" smtClean="0"/>
+              <a:t>Hauffgasse</a:t>
+            </a:r>
+            <a:endParaRPr lang="en-US" sz="1400" dirty="0" smtClean="0"/>
+          </a:p>
+          <a:p>
+            <a:r>
+              <a:rPr lang="en-US" sz="1400" dirty="0" err="1" smtClean="0"/>
+              <a:t>Nr</a:t>
+            </a:r>
+            <a:r>
+              <a:rPr lang="en-US" sz="1400" dirty="0" smtClean="0"/>
+              <a:t>.:	11</a:t>
+            </a:r>
+            <a:endParaRPr lang="en-US" sz="1400" dirty="0"/>
+          </a:p>
+        </p:txBody>
+      </p:sp>
+      <p:sp>
+        <p:nvSpPr>
+          <p:cNvPr id="79" name="Content"/>
+          <p:cNvSpPr/>
+          <p:nvPr>
+            <p:custDataLst>
+              <p:custData r:id="rId11"/>
+            </p:custDataLst>
+          </p:nvPr>
+        </p:nvSpPr>
+        <p:spPr>
+          <a:xfrm>
+            <a:off x="2904279" y="6265340"/>
+            <a:ext cx="896196" cy="228600"/>
+          </a:xfrm>
+          <a:prstGeom prst="roundRect">
+            <a:avLst/>
+          </a:prstGeom>
+          <a:solidFill>
+            <a:schemeClr val="accent4">
+              <a:lumMod val="40000"/>
+              <a:lumOff val="60000"/>
+            </a:schemeClr>
+          </a:solidFill>
+          <a:ln w="3175">
+            <a:solidFill>
+              <a:srgbClr val="000000">
+                <a:lumMod val="50000"/>
+                <a:lumOff val="50000"/>
+              </a:srgbClr>
+            </a:solidFill>
+          </a:ln>
+          <a:effectLst/>
+        </p:spPr>
+        <p:style>
+          <a:lnRef idx="2">
+            <a:srgbClr val="4F81BD">
+              <a:shade val="50000"/>
+            </a:srgbClr>
+          </a:lnRef>
+          <a:fillRef idx="1">
+            <a:srgbClr val="4F81BD"/>
+          </a:fillRef>
+          <a:effectRef idx="0">
+            <a:srgbClr val="4F81BD"/>
+          </a:effectRef>
+          <a:fontRef idx="minor">
+            <a:srgbClr val="000000"/>
+          </a:fontRef>
+        </p:style>
+        <p:txBody>
+          <a:bodyPr wrap="square" lIns="91440" tIns="0" rIns="91440" bIns="9144" rtlCol="0" anchor="ctr">
+            <a:noAutofit/>
+          </a:bodyPr>
+          <a:lstStyle/>
+          <a:p>
+            <a:pPr algn="ctr"/>
+            <a:r>
+              <a:rPr lang="en-US" sz="1200" dirty="0" err="1" smtClean="0">
+                <a:solidFill>
+                  <a:srgbClr val="000000"/>
+                </a:solidFill>
+                <a:latin typeface="Segoe UI" pitchFamily="34" charset="0"/>
+                <a:cs typeface="Segoe UI" pitchFamily="34" charset="0"/>
+              </a:rPr>
+              <a:t>ändern</a:t>
+            </a:r>
+            <a:endParaRPr lang="en-US" sz="1200" dirty="0">
+              <a:solidFill>
+                <a:srgbClr val="000000"/>
+              </a:solidFill>
+              <a:latin typeface="Segoe UI" pitchFamily="34" charset="0"/>
+              <a:cs typeface="Segoe UI" pitchFamily="34" charset="0"/>
+            </a:endParaRPr>
+          </a:p>
+        </p:txBody>
+      </p:sp>
+      <p:sp>
+        <p:nvSpPr>
+          <p:cNvPr id="92" name="Content"/>
+          <p:cNvSpPr/>
+          <p:nvPr>
+            <p:custDataLst>
+              <p:custData r:id="rId12"/>
+            </p:custDataLst>
+          </p:nvPr>
+        </p:nvSpPr>
+        <p:spPr>
+          <a:xfrm>
+            <a:off x="4019656" y="6276823"/>
+            <a:ext cx="896196" cy="228600"/>
+          </a:xfrm>
+          <a:prstGeom prst="roundRect">
+            <a:avLst/>
+          </a:prstGeom>
+          <a:solidFill>
+            <a:schemeClr val="accent2">
+              <a:lumMod val="60000"/>
+              <a:lumOff val="40000"/>
+            </a:schemeClr>
+          </a:solidFill>
+          <a:ln w="3175">
+            <a:solidFill>
+              <a:srgbClr val="000000">
+                <a:lumMod val="50000"/>
+                <a:lumOff val="50000"/>
+              </a:srgbClr>
+            </a:solidFill>
+          </a:ln>
+          <a:effectLst/>
+        </p:spPr>
+        <p:style>
+          <a:lnRef idx="2">
+            <a:srgbClr val="4F81BD">
+              <a:shade val="50000"/>
+            </a:srgbClr>
+          </a:lnRef>
+          <a:fillRef idx="1">
+            <a:srgbClr val="4F81BD"/>
+          </a:fillRef>
+          <a:effectRef idx="0">
+            <a:srgbClr val="4F81BD"/>
+          </a:effectRef>
+          <a:fontRef idx="minor">
+            <a:srgbClr val="000000"/>
+          </a:fontRef>
+        </p:style>
+        <p:txBody>
+          <a:bodyPr wrap="square" lIns="91440" tIns="0" rIns="91440" bIns="9144" rtlCol="0" anchor="ctr">
+            <a:noAutofit/>
+          </a:bodyPr>
+          <a:lstStyle/>
+          <a:p>
+            <a:pPr algn="ctr"/>
+            <a:r>
+              <a:rPr lang="en-US" sz="1200" dirty="0" err="1" smtClean="0">
+                <a:solidFill>
+                  <a:srgbClr val="000000"/>
+                </a:solidFill>
+                <a:latin typeface="Segoe UI" pitchFamily="34" charset="0"/>
+                <a:cs typeface="Segoe UI" pitchFamily="34" charset="0"/>
+              </a:rPr>
+              <a:t>löschen</a:t>
+            </a:r>
+            <a:endParaRPr lang="en-US" sz="1200" dirty="0">
+              <a:solidFill>
+                <a:srgbClr val="000000"/>
+              </a:solidFill>
+              <a:latin typeface="Segoe UI" pitchFamily="34" charset="0"/>
+              <a:cs typeface="Segoe UI" pitchFamily="34" charset="0"/>
+            </a:endParaRPr>
+          </a:p>
+        </p:txBody>
+      </p:sp>
+      <p:sp>
+        <p:nvSpPr>
+          <p:cNvPr id="103" name="Content"/>
+          <p:cNvSpPr txBox="1"/>
+          <p:nvPr>
+            <p:custDataLst>
+              <p:custData r:id="rId13"/>
+            </p:custDataLst>
+          </p:nvPr>
+        </p:nvSpPr>
+        <p:spPr>
+          <a:xfrm>
+            <a:off x="6939466" y="2337089"/>
+            <a:ext cx="625492" cy="230832"/>
+          </a:xfrm>
+          <a:prstGeom prst="rect">
+            <a:avLst/>
+          </a:prstGeom>
+          <a:noFill/>
+        </p:spPr>
+        <p:txBody>
+          <a:bodyPr wrap="none" lIns="91440" tIns="18288" rIns="91440" bIns="27432" rtlCol="0" anchor="ctr" anchorCtr="0">
+            <a:spAutoFit/>
+          </a:bodyPr>
+          <a:lstStyle/>
+          <a:p>
+            <a:r>
+              <a:rPr lang="en-US" sz="1200" dirty="0" smtClean="0">
+                <a:solidFill>
+                  <a:srgbClr val="000000"/>
+                </a:solidFill>
+                <a:latin typeface="Segoe UI" pitchFamily="34" charset="0"/>
+                <a:ea typeface="Segoe UI" pitchFamily="34" charset="0"/>
+                <a:cs typeface="Segoe UI" pitchFamily="34" charset="0"/>
+              </a:rPr>
+              <a:t>Name:</a:t>
+            </a:r>
+            <a:endParaRPr lang="en-US" sz="1200" dirty="0" smtClean="0">
+              <a:solidFill>
+                <a:srgbClr val="000000"/>
+              </a:solidFill>
+              <a:latin typeface="Segoe UI" pitchFamily="34" charset="0"/>
+              <a:ea typeface="Segoe UI" pitchFamily="34" charset="0"/>
+              <a:cs typeface="Segoe UI" pitchFamily="34" charset="0"/>
+            </a:endParaRPr>
+          </a:p>
+        </p:txBody>
+      </p:sp>
+      <p:sp>
+        <p:nvSpPr>
+          <p:cNvPr id="104" name="Content"/>
+          <p:cNvSpPr/>
+          <p:nvPr>
+            <p:custDataLst>
+              <p:custData r:id="rId14"/>
+            </p:custDataLst>
+          </p:nvPr>
+        </p:nvSpPr>
+        <p:spPr>
+          <a:xfrm>
+            <a:off x="7810049" y="2343150"/>
+            <a:ext cx="1786528" cy="224554"/>
+          </a:xfrm>
+          <a:prstGeom prst="rect">
+            <a:avLst/>
+          </a:prstGeom>
+          <a:solidFill>
+            <a:sysClr val="window" lastClr="FFFFFF"/>
+          </a:solidFill>
+          <a:ln w="3175">
+            <a:solidFill>
+              <a:srgbClr val="000000">
+                <a:lumMod val="50000"/>
+                <a:lumOff val="50000"/>
+              </a:srgbClr>
+            </a:solidFill>
+          </a:ln>
+          <a:effectLst/>
+        </p:spPr>
+        <p:style>
+          <a:lnRef idx="2">
+            <a:srgbClr val="4F81BD">
+              <a:shade val="50000"/>
+            </a:srgbClr>
+          </a:lnRef>
+          <a:fillRef idx="1">
+            <a:srgbClr val="4F81BD"/>
+          </a:fillRef>
+          <a:effectRef idx="0">
+            <a:srgbClr val="4F81BD"/>
+          </a:effectRef>
+          <a:fontRef idx="minor">
+            <a:srgbClr val="000000"/>
+          </a:fontRef>
+        </p:style>
+        <p:txBody>
+          <a:bodyPr wrap="none" lIns="45720" tIns="18288" rIns="45720" bIns="18288" rtlCol="0" anchor="ctr">
+            <a:noAutofit/>
+          </a:bodyPr>
+          <a:lstStyle/>
+          <a:p>
+            <a:r>
+              <a:rPr lang="en-US" sz="1200" dirty="0" smtClean="0">
+                <a:solidFill>
+                  <a:schemeClr val="bg1">
+                    <a:lumMod val="65000"/>
+                  </a:schemeClr>
+                </a:solidFill>
+                <a:latin typeface="Segoe UI" pitchFamily="34" charset="0"/>
+                <a:cs typeface="Segoe UI" pitchFamily="34" charset="0"/>
+              </a:rPr>
+              <a:t>3Firma</a:t>
+            </a:r>
+            <a:endParaRPr lang="en-US" sz="1200" dirty="0">
+              <a:solidFill>
+                <a:schemeClr val="bg1">
+                  <a:lumMod val="65000"/>
+                </a:schemeClr>
+              </a:solidFill>
+              <a:latin typeface="Segoe UI" pitchFamily="34" charset="0"/>
+              <a:cs typeface="Segoe UI" pitchFamily="34" charset="0"/>
+            </a:endParaRPr>
+          </a:p>
+        </p:txBody>
+      </p:sp>
+      <p:sp>
+        <p:nvSpPr>
+          <p:cNvPr id="105" name="Content"/>
+          <p:cNvSpPr txBox="1"/>
+          <p:nvPr>
+            <p:custDataLst>
+              <p:custData r:id="rId15"/>
+            </p:custDataLst>
+          </p:nvPr>
+        </p:nvSpPr>
+        <p:spPr>
+          <a:xfrm>
+            <a:off x="7078783" y="2812030"/>
+            <a:ext cx="469616" cy="230832"/>
+          </a:xfrm>
+          <a:prstGeom prst="rect">
+            <a:avLst/>
+          </a:prstGeom>
+          <a:noFill/>
+        </p:spPr>
+        <p:txBody>
+          <a:bodyPr wrap="none" lIns="91440" tIns="18288" rIns="91440" bIns="27432" rtlCol="0" anchor="ctr" anchorCtr="0">
+            <a:spAutoFit/>
+          </a:bodyPr>
+          <a:lstStyle/>
+          <a:p>
+            <a:r>
+              <a:rPr lang="en-US" sz="1200" dirty="0" smtClean="0">
+                <a:solidFill>
+                  <a:srgbClr val="000000"/>
+                </a:solidFill>
+                <a:latin typeface="Segoe UI" pitchFamily="34" charset="0"/>
+                <a:ea typeface="Segoe UI" pitchFamily="34" charset="0"/>
+                <a:cs typeface="Segoe UI" pitchFamily="34" charset="0"/>
+              </a:rPr>
+              <a:t>PLZ:</a:t>
+            </a:r>
+            <a:endParaRPr lang="en-US" sz="1200" dirty="0" smtClean="0">
+              <a:solidFill>
+                <a:srgbClr val="000000"/>
+              </a:solidFill>
+              <a:latin typeface="Segoe UI" pitchFamily="34" charset="0"/>
+              <a:ea typeface="Segoe UI" pitchFamily="34" charset="0"/>
+              <a:cs typeface="Segoe UI" pitchFamily="34" charset="0"/>
+            </a:endParaRPr>
+          </a:p>
+        </p:txBody>
+      </p:sp>
+      <p:sp>
+        <p:nvSpPr>
+          <p:cNvPr id="107" name="Content"/>
+          <p:cNvSpPr/>
+          <p:nvPr>
+            <p:custDataLst>
+              <p:custData r:id="rId16"/>
+            </p:custDataLst>
+          </p:nvPr>
+        </p:nvSpPr>
+        <p:spPr>
+          <a:xfrm>
+            <a:off x="7810049" y="2820877"/>
+            <a:ext cx="1786528" cy="224554"/>
+          </a:xfrm>
+          <a:prstGeom prst="rect">
+            <a:avLst/>
+          </a:prstGeom>
+          <a:solidFill>
+            <a:sysClr val="window" lastClr="FFFFFF"/>
+          </a:solidFill>
+          <a:ln w="3175">
+            <a:solidFill>
+              <a:srgbClr val="000000">
+                <a:lumMod val="50000"/>
+                <a:lumOff val="50000"/>
+              </a:srgbClr>
+            </a:solidFill>
+          </a:ln>
+          <a:effectLst/>
+        </p:spPr>
+        <p:style>
+          <a:lnRef idx="2">
+            <a:srgbClr val="4F81BD">
+              <a:shade val="50000"/>
+            </a:srgbClr>
+          </a:lnRef>
+          <a:fillRef idx="1">
+            <a:srgbClr val="4F81BD"/>
+          </a:fillRef>
+          <a:effectRef idx="0">
+            <a:srgbClr val="4F81BD"/>
+          </a:effectRef>
+          <a:fontRef idx="minor">
+            <a:srgbClr val="000000"/>
+          </a:fontRef>
+        </p:style>
+        <p:txBody>
+          <a:bodyPr wrap="none" lIns="45720" tIns="18288" rIns="45720" bIns="18288" rtlCol="0" anchor="ctr">
+            <a:noAutofit/>
+          </a:bodyPr>
+          <a:lstStyle/>
+          <a:p>
+            <a:r>
+              <a:rPr lang="en-US" sz="1200" dirty="0" smtClean="0">
+                <a:solidFill>
+                  <a:schemeClr val="bg1">
+                    <a:lumMod val="65000"/>
+                  </a:schemeClr>
+                </a:solidFill>
+                <a:latin typeface="Segoe UI" pitchFamily="34" charset="0"/>
+                <a:cs typeface="Segoe UI" pitchFamily="34" charset="0"/>
+              </a:rPr>
+              <a:t>1110</a:t>
+            </a:r>
+            <a:endParaRPr lang="en-US" sz="1200" dirty="0">
+              <a:solidFill>
+                <a:schemeClr val="bg1">
+                  <a:lumMod val="65000"/>
+                </a:schemeClr>
+              </a:solidFill>
+              <a:latin typeface="Segoe UI" pitchFamily="34" charset="0"/>
+              <a:cs typeface="Segoe UI" pitchFamily="34" charset="0"/>
+            </a:endParaRPr>
+          </a:p>
+        </p:txBody>
+      </p:sp>
+      <p:sp>
+        <p:nvSpPr>
+          <p:cNvPr id="108" name="Content"/>
+          <p:cNvSpPr txBox="1"/>
+          <p:nvPr>
+            <p:custDataLst>
+              <p:custData r:id="rId17"/>
+            </p:custDataLst>
+          </p:nvPr>
+        </p:nvSpPr>
+        <p:spPr>
+          <a:xfrm>
+            <a:off x="7078783" y="3296288"/>
+            <a:ext cx="443968" cy="230832"/>
+          </a:xfrm>
+          <a:prstGeom prst="rect">
+            <a:avLst/>
+          </a:prstGeom>
+          <a:noFill/>
+        </p:spPr>
+        <p:txBody>
+          <a:bodyPr wrap="none" lIns="91440" tIns="18288" rIns="91440" bIns="27432" rtlCol="0" anchor="ctr" anchorCtr="0">
+            <a:spAutoFit/>
+          </a:bodyPr>
+          <a:lstStyle/>
+          <a:p>
+            <a:r>
+              <a:rPr lang="en-US" sz="1200" dirty="0" smtClean="0">
+                <a:solidFill>
+                  <a:srgbClr val="000000"/>
+                </a:solidFill>
+                <a:latin typeface="Segoe UI" pitchFamily="34" charset="0"/>
+                <a:ea typeface="Segoe UI" pitchFamily="34" charset="0"/>
+                <a:cs typeface="Segoe UI" pitchFamily="34" charset="0"/>
+              </a:rPr>
+              <a:t>Ort:</a:t>
+            </a:r>
+            <a:endParaRPr lang="en-US" sz="1200" dirty="0" smtClean="0">
+              <a:solidFill>
+                <a:srgbClr val="000000"/>
+              </a:solidFill>
+              <a:latin typeface="Segoe UI" pitchFamily="34" charset="0"/>
+              <a:ea typeface="Segoe UI" pitchFamily="34" charset="0"/>
+              <a:cs typeface="Segoe UI" pitchFamily="34" charset="0"/>
+            </a:endParaRPr>
+          </a:p>
+        </p:txBody>
+      </p:sp>
+      <p:sp>
+        <p:nvSpPr>
+          <p:cNvPr id="109" name="Content"/>
+          <p:cNvSpPr/>
+          <p:nvPr>
+            <p:custDataLst>
+              <p:custData r:id="rId18"/>
+            </p:custDataLst>
+          </p:nvPr>
+        </p:nvSpPr>
+        <p:spPr>
+          <a:xfrm>
+            <a:off x="7810049" y="3305135"/>
+            <a:ext cx="1786528" cy="224554"/>
+          </a:xfrm>
+          <a:prstGeom prst="rect">
+            <a:avLst/>
+          </a:prstGeom>
+          <a:solidFill>
+            <a:sysClr val="window" lastClr="FFFFFF"/>
+          </a:solidFill>
+          <a:ln w="3175">
+            <a:solidFill>
+              <a:srgbClr val="000000">
+                <a:lumMod val="50000"/>
+                <a:lumOff val="50000"/>
+              </a:srgbClr>
+            </a:solidFill>
+          </a:ln>
+          <a:effectLst/>
+        </p:spPr>
+        <p:style>
+          <a:lnRef idx="2">
+            <a:srgbClr val="4F81BD">
+              <a:shade val="50000"/>
+            </a:srgbClr>
+          </a:lnRef>
+          <a:fillRef idx="1">
+            <a:srgbClr val="4F81BD"/>
+          </a:fillRef>
+          <a:effectRef idx="0">
+            <a:srgbClr val="4F81BD"/>
+          </a:effectRef>
+          <a:fontRef idx="minor">
+            <a:srgbClr val="000000"/>
+          </a:fontRef>
+        </p:style>
+        <p:txBody>
+          <a:bodyPr wrap="none" lIns="45720" tIns="18288" rIns="45720" bIns="18288" rtlCol="0" anchor="ctr">
+            <a:noAutofit/>
+          </a:bodyPr>
+          <a:lstStyle/>
+          <a:p>
+            <a:r>
+              <a:rPr lang="en-US" sz="1200" dirty="0" smtClean="0">
+                <a:solidFill>
+                  <a:schemeClr val="bg1">
+                    <a:lumMod val="65000"/>
+                  </a:schemeClr>
+                </a:solidFill>
+                <a:latin typeface="Segoe UI" pitchFamily="34" charset="0"/>
+                <a:cs typeface="Segoe UI" pitchFamily="34" charset="0"/>
+              </a:rPr>
+              <a:t>Wien</a:t>
+            </a:r>
+            <a:endParaRPr lang="en-US" sz="1200" dirty="0">
+              <a:solidFill>
+                <a:schemeClr val="bg1">
+                  <a:lumMod val="65000"/>
+                </a:schemeClr>
+              </a:solidFill>
+              <a:latin typeface="Segoe UI" pitchFamily="34" charset="0"/>
+              <a:cs typeface="Segoe UI" pitchFamily="34" charset="0"/>
+            </a:endParaRPr>
+          </a:p>
+        </p:txBody>
+      </p:sp>
+      <p:sp>
+        <p:nvSpPr>
+          <p:cNvPr id="110" name="Content"/>
+          <p:cNvSpPr txBox="1"/>
+          <p:nvPr>
+            <p:custDataLst>
+              <p:custData r:id="rId19"/>
+            </p:custDataLst>
+          </p:nvPr>
+        </p:nvSpPr>
+        <p:spPr>
+          <a:xfrm>
+            <a:off x="6899781" y="3800025"/>
+            <a:ext cx="691087" cy="230832"/>
+          </a:xfrm>
+          <a:prstGeom prst="rect">
+            <a:avLst/>
+          </a:prstGeom>
+          <a:noFill/>
+        </p:spPr>
+        <p:txBody>
+          <a:bodyPr wrap="none" lIns="91440" tIns="18288" rIns="91440" bIns="27432" rtlCol="0" anchor="ctr" anchorCtr="0">
+            <a:spAutoFit/>
+          </a:bodyPr>
+          <a:lstStyle/>
+          <a:p>
+            <a:r>
+              <a:rPr lang="en-US" sz="1200" dirty="0" err="1" smtClean="0">
+                <a:solidFill>
+                  <a:srgbClr val="000000"/>
+                </a:solidFill>
+                <a:latin typeface="Segoe UI" pitchFamily="34" charset="0"/>
+                <a:ea typeface="Segoe UI" pitchFamily="34" charset="0"/>
+                <a:cs typeface="Segoe UI" pitchFamily="34" charset="0"/>
+              </a:rPr>
+              <a:t>Strasse</a:t>
+            </a:r>
+            <a:r>
+              <a:rPr lang="en-US" sz="1200" dirty="0" smtClean="0">
+                <a:solidFill>
+                  <a:srgbClr val="000000"/>
+                </a:solidFill>
+                <a:latin typeface="Segoe UI" pitchFamily="34" charset="0"/>
+                <a:ea typeface="Segoe UI" pitchFamily="34" charset="0"/>
+                <a:cs typeface="Segoe UI" pitchFamily="34" charset="0"/>
+              </a:rPr>
+              <a:t>:</a:t>
+            </a:r>
+            <a:endParaRPr lang="en-US" sz="1200" dirty="0" smtClean="0">
+              <a:solidFill>
+                <a:srgbClr val="000000"/>
+              </a:solidFill>
+              <a:latin typeface="Segoe UI" pitchFamily="34" charset="0"/>
+              <a:ea typeface="Segoe UI" pitchFamily="34" charset="0"/>
+              <a:cs typeface="Segoe UI" pitchFamily="34" charset="0"/>
+            </a:endParaRPr>
+          </a:p>
+        </p:txBody>
+      </p:sp>
+      <p:sp>
+        <p:nvSpPr>
+          <p:cNvPr id="111" name="Content"/>
+          <p:cNvSpPr/>
+          <p:nvPr>
+            <p:custDataLst>
+              <p:custData r:id="rId20"/>
+            </p:custDataLst>
+          </p:nvPr>
+        </p:nvSpPr>
+        <p:spPr>
+          <a:xfrm>
+            <a:off x="7810049" y="3800417"/>
+            <a:ext cx="1786528" cy="224554"/>
+          </a:xfrm>
+          <a:prstGeom prst="rect">
+            <a:avLst/>
+          </a:prstGeom>
+          <a:solidFill>
+            <a:sysClr val="window" lastClr="FFFFFF"/>
+          </a:solidFill>
+          <a:ln w="3175">
+            <a:solidFill>
+              <a:srgbClr val="000000">
+                <a:lumMod val="50000"/>
+                <a:lumOff val="50000"/>
+              </a:srgbClr>
+            </a:solidFill>
+          </a:ln>
+          <a:effectLst/>
+        </p:spPr>
+        <p:style>
+          <a:lnRef idx="2">
+            <a:srgbClr val="4F81BD">
+              <a:shade val="50000"/>
+            </a:srgbClr>
+          </a:lnRef>
+          <a:fillRef idx="1">
+            <a:srgbClr val="4F81BD"/>
+          </a:fillRef>
+          <a:effectRef idx="0">
+            <a:srgbClr val="4F81BD"/>
+          </a:effectRef>
+          <a:fontRef idx="minor">
+            <a:srgbClr val="000000"/>
+          </a:fontRef>
+        </p:style>
+        <p:txBody>
+          <a:bodyPr wrap="none" lIns="45720" tIns="18288" rIns="45720" bIns="18288" rtlCol="0" anchor="ctr">
+            <a:noAutofit/>
+          </a:bodyPr>
+          <a:lstStyle/>
+          <a:p>
+            <a:r>
+              <a:rPr lang="en-US" sz="1200" dirty="0" err="1" smtClean="0">
+                <a:solidFill>
+                  <a:schemeClr val="bg1">
+                    <a:lumMod val="65000"/>
+                  </a:schemeClr>
+                </a:solidFill>
+                <a:latin typeface="Segoe UI" pitchFamily="34" charset="0"/>
+                <a:cs typeface="Segoe UI" pitchFamily="34" charset="0"/>
+              </a:rPr>
+              <a:t>Hauptplatz</a:t>
+            </a:r>
+            <a:endParaRPr lang="en-US" sz="1200" dirty="0">
+              <a:solidFill>
+                <a:schemeClr val="bg1">
+                  <a:lumMod val="65000"/>
+                </a:schemeClr>
+              </a:solidFill>
+              <a:latin typeface="Segoe UI" pitchFamily="34" charset="0"/>
+              <a:cs typeface="Segoe UI" pitchFamily="34" charset="0"/>
+            </a:endParaRPr>
+          </a:p>
+        </p:txBody>
+      </p:sp>
+      <p:sp>
+        <p:nvSpPr>
+          <p:cNvPr id="112" name="Content"/>
+          <p:cNvSpPr txBox="1"/>
+          <p:nvPr>
+            <p:custDataLst>
+              <p:custData r:id="rId21"/>
+            </p:custDataLst>
+          </p:nvPr>
+        </p:nvSpPr>
+        <p:spPr>
+          <a:xfrm>
+            <a:off x="7115204" y="4284283"/>
+            <a:ext cx="407547" cy="230832"/>
+          </a:xfrm>
+          <a:prstGeom prst="rect">
+            <a:avLst/>
+          </a:prstGeom>
+          <a:noFill/>
+        </p:spPr>
+        <p:txBody>
+          <a:bodyPr wrap="none" lIns="91440" tIns="18288" rIns="91440" bIns="27432" rtlCol="0" anchor="ctr" anchorCtr="0">
+            <a:spAutoFit/>
+          </a:bodyPr>
+          <a:lstStyle/>
+          <a:p>
+            <a:r>
+              <a:rPr lang="en-US" sz="1200" dirty="0" err="1" smtClean="0">
+                <a:solidFill>
+                  <a:srgbClr val="000000"/>
+                </a:solidFill>
+                <a:latin typeface="Segoe UI" pitchFamily="34" charset="0"/>
+                <a:ea typeface="Segoe UI" pitchFamily="34" charset="0"/>
+                <a:cs typeface="Segoe UI" pitchFamily="34" charset="0"/>
+              </a:rPr>
+              <a:t>Nr</a:t>
+            </a:r>
+            <a:r>
+              <a:rPr lang="en-US" sz="1200" dirty="0" smtClean="0">
+                <a:solidFill>
+                  <a:srgbClr val="000000"/>
+                </a:solidFill>
+                <a:latin typeface="Segoe UI" pitchFamily="34" charset="0"/>
+                <a:ea typeface="Segoe UI" pitchFamily="34" charset="0"/>
+                <a:cs typeface="Segoe UI" pitchFamily="34" charset="0"/>
+              </a:rPr>
+              <a:t>.:</a:t>
+            </a:r>
+            <a:endParaRPr lang="en-US" sz="1200" dirty="0" smtClean="0">
+              <a:solidFill>
+                <a:srgbClr val="000000"/>
+              </a:solidFill>
+              <a:latin typeface="Segoe UI" pitchFamily="34" charset="0"/>
+              <a:ea typeface="Segoe UI" pitchFamily="34" charset="0"/>
+              <a:cs typeface="Segoe UI" pitchFamily="34" charset="0"/>
+            </a:endParaRPr>
+          </a:p>
+        </p:txBody>
+      </p:sp>
+      <p:sp>
+        <p:nvSpPr>
+          <p:cNvPr id="113" name="Content"/>
+          <p:cNvSpPr/>
+          <p:nvPr>
+            <p:custDataLst>
+              <p:custData r:id="rId22"/>
+            </p:custDataLst>
+          </p:nvPr>
+        </p:nvSpPr>
+        <p:spPr>
+          <a:xfrm>
+            <a:off x="7810049" y="4293130"/>
+            <a:ext cx="1786528" cy="224554"/>
+          </a:xfrm>
+          <a:prstGeom prst="rect">
+            <a:avLst/>
+          </a:prstGeom>
+          <a:solidFill>
+            <a:sysClr val="window" lastClr="FFFFFF"/>
+          </a:solidFill>
+          <a:ln w="3175">
+            <a:solidFill>
+              <a:srgbClr val="000000">
+                <a:lumMod val="50000"/>
+                <a:lumOff val="50000"/>
+              </a:srgbClr>
+            </a:solidFill>
+          </a:ln>
+          <a:effectLst/>
+        </p:spPr>
+        <p:style>
+          <a:lnRef idx="2">
+            <a:srgbClr val="4F81BD">
+              <a:shade val="50000"/>
+            </a:srgbClr>
+          </a:lnRef>
+          <a:fillRef idx="1">
+            <a:srgbClr val="4F81BD"/>
+          </a:fillRef>
+          <a:effectRef idx="0">
+            <a:srgbClr val="4F81BD"/>
+          </a:effectRef>
+          <a:fontRef idx="minor">
+            <a:srgbClr val="000000"/>
+          </a:fontRef>
+        </p:style>
+        <p:txBody>
+          <a:bodyPr wrap="none" lIns="45720" tIns="18288" rIns="45720" bIns="18288" rtlCol="0" anchor="ctr">
+            <a:noAutofit/>
+          </a:bodyPr>
+          <a:lstStyle/>
+          <a:p>
+            <a:r>
+              <a:rPr lang="en-US" sz="1200" dirty="0" smtClean="0">
+                <a:solidFill>
+                  <a:schemeClr val="bg1">
+                    <a:lumMod val="65000"/>
+                  </a:schemeClr>
+                </a:solidFill>
+                <a:latin typeface="Segoe UI" pitchFamily="34" charset="0"/>
+                <a:cs typeface="Segoe UI" pitchFamily="34" charset="0"/>
+              </a:rPr>
+              <a:t>3</a:t>
+            </a:r>
+            <a:endParaRPr lang="en-US" sz="1200" dirty="0">
+              <a:solidFill>
+                <a:schemeClr val="bg1">
+                  <a:lumMod val="65000"/>
+                </a:schemeClr>
+              </a:solidFill>
+              <a:latin typeface="Segoe UI" pitchFamily="34" charset="0"/>
+              <a:cs typeface="Segoe UI" pitchFamily="34" charset="0"/>
+            </a:endParaRPr>
+          </a:p>
+        </p:txBody>
+      </p:sp>
+      <p:sp>
+        <p:nvSpPr>
+          <p:cNvPr id="114" name="Content"/>
+          <p:cNvSpPr/>
+          <p:nvPr>
+            <p:custDataLst>
+              <p:custData r:id="rId23"/>
+            </p:custDataLst>
+          </p:nvPr>
+        </p:nvSpPr>
+        <p:spPr>
+          <a:xfrm>
+            <a:off x="7812349" y="4835370"/>
+            <a:ext cx="1384626" cy="270030"/>
+          </a:xfrm>
+          <a:prstGeom prst="roundRect">
+            <a:avLst/>
+          </a:prstGeom>
+          <a:solidFill>
+            <a:schemeClr val="accent6">
+              <a:lumMod val="40000"/>
+              <a:lumOff val="60000"/>
+            </a:schemeClr>
+          </a:solidFill>
+          <a:ln w="3175">
+            <a:solidFill>
+              <a:srgbClr val="000000">
+                <a:lumMod val="50000"/>
+                <a:lumOff val="50000"/>
+              </a:srgbClr>
+            </a:solidFill>
+          </a:ln>
+          <a:effectLst/>
+        </p:spPr>
+        <p:style>
+          <a:lnRef idx="2">
+            <a:srgbClr val="4F81BD">
+              <a:shade val="50000"/>
+            </a:srgbClr>
+          </a:lnRef>
+          <a:fillRef idx="1">
+            <a:srgbClr val="4F81BD"/>
+          </a:fillRef>
+          <a:effectRef idx="0">
+            <a:srgbClr val="4F81BD"/>
+          </a:effectRef>
+          <a:fontRef idx="minor">
+            <a:srgbClr val="000000"/>
+          </a:fontRef>
+        </p:style>
+        <p:txBody>
+          <a:bodyPr wrap="square" lIns="91440" tIns="0" rIns="91440" bIns="9144" rtlCol="0" anchor="ctr">
+            <a:noAutofit/>
+          </a:bodyPr>
+          <a:lstStyle/>
+          <a:p>
+            <a:pPr algn="ctr"/>
+            <a:r>
+              <a:rPr lang="en-US" sz="1200" dirty="0" err="1" smtClean="0">
+                <a:latin typeface="Segoe UI" pitchFamily="34" charset="0"/>
+                <a:cs typeface="Segoe UI" pitchFamily="34" charset="0"/>
+              </a:rPr>
+              <a:t>erstellen</a:t>
+            </a:r>
+            <a:endParaRPr lang="en-US" sz="1200" dirty="0">
+              <a:solidFill>
+                <a:srgbClr val="000000"/>
+              </a:solidFill>
+              <a:latin typeface="Segoe UI" pitchFamily="34" charset="0"/>
+              <a:cs typeface="Segoe UI" pitchFamily="34" charset="0"/>
+            </a:endParaRPr>
+          </a:p>
+        </p:txBody>
+      </p:sp>
+    </p:spTree>
+    <p:extLst>
+      <p:ext uri="{BB962C8B-B14F-4D97-AF65-F5344CB8AC3E}">
+        <p14:creationId xmlns:p14="http://schemas.microsoft.com/office/powerpoint/2010/main" val="2752630536"/>
+      </p:ext>
+    </p:extLst>
+  </p:cSld>
+  <p:clrMapOvr>
+    <a:masterClrMapping/>
+  </p:clrMapOvr>
+  <p:timing>
+    <p:tnLst>
+      <p:par>
+        <p:cTn id="1" dur="indefinite" restart="never" nodeType="tmRoot"/>
+      </p:par>
+    </p:tnLst>
+  </p:timing>
+</p:sld>
+</file>
+
 <file path=ppt/theme/theme1.xml><?xml version="1.0" encoding="utf-8"?>
 <a:theme xmlns:a="http://schemas.openxmlformats.org/drawingml/2006/main" name="Office Theme">
   <a:themeElements>
@@ -7098,43 +9880,43 @@
 
 <file path=customXml/item1.xml><?xml version="1.0" encoding="utf-8"?>
 <Control xmlns="http://schemas.microsoft.com/VisualStudio/2011/storyboarding/control">
+  <Id Name="System.Storyboarding.Annotation.StickyNote" Revision="1" Stencil="System.Storyboarding.Annotation" StencilVersion="0.1"/>
+</Control>
+</file>
+
+<file path=customXml/item10.xml><?xml version="1.0" encoding="utf-8"?>
+<Control xmlns="http://schemas.microsoft.com/VisualStudio/2011/storyboarding/control">
+  <Id Name="System.Storyboarding.Icons.User" Revision="1" Stencil="System.Storyboarding.Icons" StencilVersion="0.1"/>
+</Control>
+</file>
+
+<file path=customXml/item11.xml><?xml version="1.0" encoding="utf-8"?>
+<Control xmlns="http://schemas.microsoft.com/VisualStudio/2011/storyboarding/control">
   <Id Name="System.Storyboarding.Common.Hyperlink" Revision="1" Stencil="System.Storyboarding.Common" StencilVersion="0.1"/>
 </Control>
 </file>
 
-<file path=customXml/item10.xml><?xml version="1.0" encoding="utf-8"?>
+<file path=customXml/item12.xml><?xml version="1.0" encoding="utf-8"?>
+<Control xmlns="http://schemas.microsoft.com/VisualStudio/2011/storyboarding/control">
+  <Id Name="System.Storyboarding.Backgrounds.WebBrowser" Revision="1" Stencil="System.Storyboarding.Backgrounds" StencilVersion="0.1"/>
+</Control>
+</file>
+
+<file path=customXml/item13.xml><?xml version="1.0" encoding="utf-8"?>
 <Control xmlns="http://schemas.microsoft.com/VisualStudio/2011/storyboarding/control">
   <Id Name="System.Storyboarding.Annotation.StickyNote" Revision="1" Stencil="System.Storyboarding.Annotation" StencilVersion="0.1"/>
 </Control>
 </file>
 
-<file path=customXml/item11.xml><?xml version="1.0" encoding="utf-8"?>
-<Control xmlns="http://schemas.microsoft.com/VisualStudio/2011/storyboarding/control">
-  <Id Name="System.Storyboarding.Annotation.StickyNote" Revision="1" Stencil="System.Storyboarding.Annotation" StencilVersion="0.1"/>
-</Control>
-</file>
-
-<file path=customXml/item12.xml><?xml version="1.0" encoding="utf-8"?>
-<Control xmlns="http://schemas.microsoft.com/VisualStudio/2011/storyboarding/control">
-  <Id Name="System.Storyboarding.Common.Text" Revision="1" Stencil="System.Storyboarding.Common" StencilVersion="0.1"/>
-</Control>
-</file>
-
-<file path=customXml/item13.xml><?xml version="1.0" encoding="utf-8"?>
-<Control xmlns="http://schemas.microsoft.com/VisualStudio/2011/storyboarding/control">
-  <Id Name="System.Storyboarding.Common.Text" Revision="1" Stencil="System.Storyboarding.Common" StencilVersion="0.1"/>
-</Control>
-</file>
-
 <file path=customXml/item14.xml><?xml version="1.0" encoding="utf-8"?>
 <Control xmlns="http://schemas.microsoft.com/VisualStudio/2011/storyboarding/control">
-  <Id Name="System.Storyboarding.Annotation.StickyNote" Revision="1" Stencil="System.Storyboarding.Annotation" StencilVersion="0.1"/>
+  <Id Name="System.Storyboarding.Common.Hyperlink" Revision="1" Stencil="System.Storyboarding.Common" StencilVersion="0.1"/>
 </Control>
 </file>
 
 <file path=customXml/item15.xml><?xml version="1.0" encoding="utf-8"?>
 <Control xmlns="http://schemas.microsoft.com/VisualStudio/2011/storyboarding/control">
-  <Id Name="System.Storyboarding.Common.Text" Revision="1" Stencil="System.Storyboarding.Common" StencilVersion="0.1"/>
+  <Id Name="System.Storyboarding.Common.Hyperlink" Revision="1" Stencil="System.Storyboarding.Common" StencilVersion="0.1"/>
 </Control>
 </file>
 
@@ -7146,7 +9928,7 @@
 
 <file path=customXml/item17.xml><?xml version="1.0" encoding="utf-8"?>
 <Control xmlns="http://schemas.microsoft.com/VisualStudio/2011/storyboarding/control">
-  <Id Name="System.Storyboarding.Common.Text" Revision="1" Stencil="System.Storyboarding.Common" StencilVersion="0.1"/>
+  <Id Name="System.Storyboarding.Annotation.StickyNote" Revision="1" Stencil="System.Storyboarding.Annotation" StencilVersion="0.1"/>
 </Control>
 </file>
 
@@ -7158,49 +9940,49 @@
 
 <file path=customXml/item19.xml><?xml version="1.0" encoding="utf-8"?>
 <Control xmlns="http://schemas.microsoft.com/VisualStudio/2011/storyboarding/control">
-  <Id Name="System.Storyboarding.Annotation.StickyNote" Revision="1" Stencil="System.Storyboarding.Annotation" StencilVersion="0.1"/>
+  <Id Name="System.Storyboarding.Common.Hyperlink" Revision="1" Stencil="System.Storyboarding.Common" StencilVersion="0.1"/>
 </Control>
 </file>
 
 <file path=customXml/item2.xml><?xml version="1.0" encoding="utf-8"?>
+<Control xmlns="http://schemas.microsoft.com/VisualStudio/2011/storyboarding/control">
+  <Id Name="System.Storyboarding.Common.Text" Revision="1" Stencil="System.Storyboarding.Common" StencilVersion="0.1"/>
+</Control>
+</file>
+
+<file path=customXml/item20.xml><?xml version="1.0" encoding="utf-8"?>
+<Control xmlns="http://schemas.microsoft.com/VisualStudio/2011/storyboarding/control">
+  <Id Name="System.Storyboarding.Common.Text" Revision="1" Stencil="System.Storyboarding.Common" StencilVersion="0.1"/>
+</Control>
+</file>
+
+<file path=customXml/item21.xml><?xml version="1.0" encoding="utf-8"?>
+<Control xmlns="http://schemas.microsoft.com/VisualStudio/2011/storyboarding/control">
+  <Id Name="System.Storyboarding.Common.Text" Revision="1" Stencil="System.Storyboarding.Common" StencilVersion="0.1"/>
+</Control>
+</file>
+
+<file path=customXml/item22.xml><?xml version="1.0" encoding="utf-8"?>
 <Control xmlns="http://schemas.microsoft.com/VisualStudio/2011/storyboarding/control">
   <Id Name="System.Storyboarding.Annotation.StickyNote" Revision="1" Stencil="System.Storyboarding.Annotation" StencilVersion="0.1"/>
 </Control>
 </file>
 
-<file path=customXml/item20.xml><?xml version="1.0" encoding="utf-8"?>
+<file path=customXml/item23.xml><?xml version="1.0" encoding="utf-8"?>
 <Control xmlns="http://schemas.microsoft.com/VisualStudio/2011/storyboarding/control">
   <Id Name="System.Storyboarding.Annotation.StickyNote" Revision="1" Stencil="System.Storyboarding.Annotation" StencilVersion="0.1"/>
 </Control>
 </file>
 
-<file path=customXml/item21.xml><?xml version="1.0" encoding="utf-8"?>
+<file path=customXml/item24.xml><?xml version="1.0" encoding="utf-8"?>
 <Control xmlns="http://schemas.microsoft.com/VisualStudio/2011/storyboarding/control">
-  <Id Name="System.Storyboarding.WindowsDesktop.MenuBar" Revision="1" Stencil="System.Storyboarding.WindowsDesktop" StencilVersion="0.1"/>
+  <Id Name="System.Storyboarding.Backgrounds.WebBrowser" Revision="1" Stencil="System.Storyboarding.Backgrounds" StencilVersion="0.1"/>
 </Control>
 </file>
 
-<file path=customXml/item22.xml><?xml version="1.0" encoding="utf-8"?>
-<Control xmlns="http://schemas.microsoft.com/VisualStudio/2011/storyboarding/control">
-  <Id Name="System.Storyboarding.Common.Text" Revision="1" Stencil="System.Storyboarding.Common" StencilVersion="0.1"/>
-</Control>
-</file>
-
-<file path=customXml/item23.xml><?xml version="1.0" encoding="utf-8"?>
+<file path=customXml/item25.xml><?xml version="1.0" encoding="utf-8"?>
 <Control xmlns="http://schemas.microsoft.com/VisualStudio/2011/storyboarding/control">
   <Id Name="System.Storyboarding.Common.Hyperlink" Revision="1" Stencil="System.Storyboarding.Common" StencilVersion="0.1"/>
-</Control>
-</file>
-
-<file path=customXml/item24.xml><?xml version="1.0" encoding="utf-8"?>
-<Control xmlns="http://schemas.microsoft.com/VisualStudio/2011/storyboarding/control">
-  <Id Name="System.Storyboarding.Common.Hyperlink" Revision="1" Stencil="System.Storyboarding.Common" StencilVersion="0.1"/>
-</Control>
-</file>
-
-<file path=customXml/item25.xml><?xml version="1.0" encoding="utf-8"?>
-<Control xmlns="http://schemas.microsoft.com/VisualStudio/2011/storyboarding/control">
-  <Id Name="System.Storyboarding.Common.Text" Revision="1" Stencil="System.Storyboarding.Common" StencilVersion="0.1"/>
 </Control>
 </file>
 
@@ -7212,7 +9994,7 @@
 
 <file path=customXml/item27.xml><?xml version="1.0" encoding="utf-8"?>
 <Control xmlns="http://schemas.microsoft.com/VisualStudio/2011/storyboarding/control">
-  <Id Name="System.Storyboarding.Common.Hyperlink" Revision="1" Stencil="System.Storyboarding.Common" StencilVersion="0.1"/>
+  <Id Name="System.Storyboarding.Annotation.StickyNote" Revision="1" Stencil="System.Storyboarding.Annotation" StencilVersion="0.1"/>
 </Control>
 </file>
 
@@ -7224,13 +10006,13 @@
 
 <file path=customXml/item29.xml><?xml version="1.0" encoding="utf-8"?>
 <Control xmlns="http://schemas.microsoft.com/VisualStudio/2011/storyboarding/control">
-  <Id Name="System.Storyboarding.Icons.User" Revision="1" Stencil="System.Storyboarding.Icons" StencilVersion="0.1"/>
+  <Id Name="System.Storyboarding.Common.Hyperlink" Revision="1" Stencil="System.Storyboarding.Common" StencilVersion="0.1"/>
 </Control>
 </file>
 
 <file path=customXml/item3.xml><?xml version="1.0" encoding="utf-8"?>
 <Control xmlns="http://schemas.microsoft.com/VisualStudio/2011/storyboarding/control">
-  <Id Name="System.Storyboarding.WindowsDesktop.MenuBar" Revision="1" Stencil="System.Storyboarding.WindowsDesktop" StencilVersion="0.1"/>
+  <Id Name="System.Storyboarding.Common.Text" Revision="1" Stencil="System.Storyboarding.Common" StencilVersion="0.1"/>
 </Control>
 </file>
 
@@ -7242,13 +10024,13 @@
 
 <file path=customXml/item31.xml><?xml version="1.0" encoding="utf-8"?>
 <Control xmlns="http://schemas.microsoft.com/VisualStudio/2011/storyboarding/control">
-  <Id Name="System.Storyboarding.Backgrounds.WebBrowser" Revision="1" Stencil="System.Storyboarding.Backgrounds" StencilVersion="0.1"/>
+  <Id Name="System.Storyboarding.Annotation.StickyNote" Revision="1" Stencil="System.Storyboarding.Annotation" StencilVersion="0.1"/>
 </Control>
 </file>
 
 <file path=customXml/item32.xml><?xml version="1.0" encoding="utf-8"?>
 <Control xmlns="http://schemas.microsoft.com/VisualStudio/2011/storyboarding/control">
-  <Id Name="System.Storyboarding.Common.Hyperlink" Revision="1" Stencil="System.Storyboarding.Common" StencilVersion="0.1"/>
+  <Id Name="System.Storyboarding.Common.Text" Revision="1" Stencil="System.Storyboarding.Common" StencilVersion="0.1"/>
 </Control>
 </file>
 
@@ -7260,55 +10042,193 @@
 
 <file path=customXml/item34.xml><?xml version="1.0" encoding="utf-8"?>
 <Control xmlns="http://schemas.microsoft.com/VisualStudio/2011/storyboarding/control">
-  <Id Name="System.Storyboarding.Icons.User" Revision="1" Stencil="System.Storyboarding.Icons" StencilVersion="0.1"/>
+  <Id Name="System.Storyboarding.Common.Text" Revision="1" Stencil="System.Storyboarding.Common" StencilVersion="0.1"/>
 </Control>
 </file>
 
 <file path=customXml/item35.xml><?xml version="1.0" encoding="utf-8"?>
+<Control xmlns="http://schemas.microsoft.com/VisualStudio/2011/storyboarding/control">
+  <Id Name="System.Storyboarding.Common.Text" Revision="1" Stencil="System.Storyboarding.Common" StencilVersion="0.1"/>
+</Control>
+</file>
+
+<file path=customXml/item36.xml><?xml version="1.0" encoding="utf-8"?>
 <Control xmlns="http://schemas.microsoft.com/VisualStudio/2011/storyboarding/control">
   <Id Name="System.Storyboarding.Annotation.StickyNote" Revision="1" Stencil="System.Storyboarding.Annotation" StencilVersion="0.1"/>
 </Control>
 </file>
 
-<file path=customXml/item36.xml><?xml version="1.0" encoding="utf-8"?>
+<file path=customXml/item37.xml><?xml version="1.0" encoding="utf-8"?>
+<Control xmlns="http://schemas.microsoft.com/VisualStudio/2011/storyboarding/control">
+  <Id Name="System.Storyboarding.WindowsDesktop.MenuBar" Revision="1" Stencil="System.Storyboarding.WindowsDesktop" StencilVersion="0.1"/>
+</Control>
+</file>
+
+<file path=customXml/item38.xml><?xml version="1.0" encoding="utf-8"?>
+<Control xmlns="http://schemas.microsoft.com/VisualStudio/2011/storyboarding/control">
+  <Id Name="System.Storyboarding.WindowsDesktop.MenuBar" Revision="1" Stencil="System.Storyboarding.WindowsDesktop" StencilVersion="0.1"/>
+</Control>
+</file>
+
+<file path=customXml/item39.xml><?xml version="1.0" encoding="utf-8"?>
+<Control xmlns="http://schemas.microsoft.com/VisualStudio/2011/storyboarding/control">
+  <Id Name="System.Storyboarding.Icons.User" Revision="1" Stencil="System.Storyboarding.Icons" StencilVersion="0.1"/>
+</Control>
+</file>
+
+<file path=customXml/item4.xml><?xml version="1.0" encoding="utf-8"?>
 <Control xmlns="http://schemas.microsoft.com/VisualStudio/2011/storyboarding/control">
   <Id Name="System.Storyboarding.Common.Text" Revision="1" Stencil="System.Storyboarding.Common" StencilVersion="0.1"/>
 </Control>
 </file>
 
-<file path=customXml/item37.xml><?xml version="1.0" encoding="utf-8"?>
+<file path=customXml/item40.xml><?xml version="1.0" encoding="utf-8"?>
 <Control xmlns="http://schemas.microsoft.com/VisualStudio/2011/storyboarding/control">
-  <Id Name="System.Storyboarding.Common.Hyperlink" Revision="1" Stencil="System.Storyboarding.Common" StencilVersion="0.1"/>
+  <Id Name="System.Storyboarding.Backgrounds.WebBrowser" Revision="1" Stencil="System.Storyboarding.Backgrounds" StencilVersion="0.1"/>
 </Control>
 </file>
 
-<file path=customXml/item38.xml><?xml version="1.0" encoding="utf-8"?>
+<file path=customXml/item41.xml><?xml version="1.0" encoding="utf-8"?>
+<Control xmlns="http://schemas.microsoft.com/VisualStudio/2011/storyboarding/control">
+  <Id Name="System.Storyboarding.WindowsDesktop.MenuBar" Revision="1" Stencil="System.Storyboarding.WindowsDesktop" StencilVersion="0.1"/>
+</Control>
+</file>
+
+<file path=customXml/item42.xml><?xml version="1.0" encoding="utf-8"?>
+<Control xmlns="http://schemas.microsoft.com/VisualStudio/2011/storyboarding/control">
+  <Id Name="System.Storyboarding.Common.Text" Revision="1" Stencil="System.Storyboarding.Common" StencilVersion="0.1"/>
+</Control>
+</file>
+
+<file path=customXml/item43.xml><?xml version="1.0" encoding="utf-8"?>
+<Control xmlns="http://schemas.microsoft.com/VisualStudio/2011/storyboarding/control">
+  <Id Name="System.Storyboarding.Icons.User" Revision="1" Stencil="System.Storyboarding.Icons" StencilVersion="0.1"/>
+</Control>
+</file>
+
+<file path=customXml/item44.xml><?xml version="1.0" encoding="utf-8"?>
+<Control xmlns="http://schemas.microsoft.com/VisualStudio/2011/storyboarding/control">
+  <Id Name="System.Storyboarding.Common.Text" Revision="1" Stencil="System.Storyboarding.Common" StencilVersion="0.1"/>
+</Control>
+</file>
+
+<file path=customXml/item45.xml><?xml version="1.0" encoding="utf-8"?>
+<Control xmlns="http://schemas.microsoft.com/VisualStudio/2011/storyboarding/control">
+  <Id Name="System.Storyboarding.Common.Text" Revision="1" Stencil="System.Storyboarding.Common" StencilVersion="0.1"/>
+</Control>
+</file>
+
+<file path=customXml/item46.xml><?xml version="1.0" encoding="utf-8"?>
+<Control xmlns="http://schemas.microsoft.com/VisualStudio/2011/storyboarding/control">
+  <Id Name="System.Storyboarding.Common.Text" Revision="1" Stencil="System.Storyboarding.Common" StencilVersion="0.1"/>
+</Control>
+</file>
+
+<file path=customXml/item47.xml><?xml version="1.0" encoding="utf-8"?>
+<Control xmlns="http://schemas.microsoft.com/VisualStudio/2011/storyboarding/control">
+  <Id Name="System.Storyboarding.Common.Button" Revision="1" Stencil="System.Storyboarding.Common" StencilVersion="0.1"/>
+</Control>
+</file>
+
+<file path=customXml/item48.xml><?xml version="1.0" encoding="utf-8"?>
+<Control xmlns="http://schemas.microsoft.com/VisualStudio/2011/storyboarding/control">
+  <Id Name="System.Storyboarding.Common.Button" Revision="1" Stencil="System.Storyboarding.Common" StencilVersion="0.1"/>
+</Control>
+</file>
+
+<file path=customXml/item49.xml><?xml version="1.0" encoding="utf-8"?>
+<Control xmlns="http://schemas.microsoft.com/VisualStudio/2011/storyboarding/control">
+  <Id Name="System.Storyboarding.Common.Button" Revision="1" Stencil="System.Storyboarding.Common" StencilVersion="0.1"/>
+</Control>
+</file>
+
+<file path=customXml/item5.xml><?xml version="1.0" encoding="utf-8"?>
+<Control xmlns="http://schemas.microsoft.com/VisualStudio/2011/storyboarding/control">
+  <Id Name="System.Storyboarding.Common.Text" Revision="1" Stencil="System.Storyboarding.Common" StencilVersion="0.1"/>
+</Control>
+</file>
+
+<file path=customXml/item50.xml><?xml version="1.0" encoding="utf-8"?>
+<Control xmlns="http://schemas.microsoft.com/VisualStudio/2011/storyboarding/control">
+  <Id Name="System.Storyboarding.Common.Button" Revision="1" Stencil="System.Storyboarding.Common" StencilVersion="0.1"/>
+</Control>
+</file>
+
+<file path=customXml/item51.xml><?xml version="1.0" encoding="utf-8"?>
+<Control xmlns="http://schemas.microsoft.com/VisualStudio/2011/storyboarding/control">
+  <Id Name="System.Storyboarding.Common.Button" Revision="1" Stencil="System.Storyboarding.Common" StencilVersion="0.1"/>
+</Control>
+</file>
+
+<file path=customXml/item52.xml><?xml version="1.0" encoding="utf-8"?>
+<Control xmlns="http://schemas.microsoft.com/VisualStudio/2011/storyboarding/control">
+  <Id Name="System.Storyboarding.Common.Text" Revision="1" Stencil="System.Storyboarding.Common" StencilVersion="0.1"/>
+</Control>
+</file>
+
+<file path=customXml/item53.xml><?xml version="1.0" encoding="utf-8"?>
+<Control xmlns="http://schemas.microsoft.com/VisualStudio/2011/storyboarding/control">
+  <Id Name="System.Storyboarding.Common.TextInput" Revision="1" Stencil="System.Storyboarding.Common" StencilVersion="0.1"/>
+</Control>
+</file>
+
+<file path=customXml/item54.xml><?xml version="1.0" encoding="utf-8"?>
+<Control xmlns="http://schemas.microsoft.com/VisualStudio/2011/storyboarding/control">
+  <Id Name="System.Storyboarding.Common.Text" Revision="1" Stencil="System.Storyboarding.Common" StencilVersion="0.1"/>
+</Control>
+</file>
+
+<file path=customXml/item55.xml><?xml version="1.0" encoding="utf-8"?>
+<Control xmlns="http://schemas.microsoft.com/VisualStudio/2011/storyboarding/control">
+  <Id Name="System.Storyboarding.Common.TextInput" Revision="1" Stencil="System.Storyboarding.Common" StencilVersion="0.1"/>
+</Control>
+</file>
+
+<file path=customXml/item56.xml><?xml version="1.0" encoding="utf-8"?>
+<Control xmlns="http://schemas.microsoft.com/VisualStudio/2011/storyboarding/control">
+  <Id Name="System.Storyboarding.Common.Text" Revision="1" Stencil="System.Storyboarding.Common" StencilVersion="0.1"/>
+</Control>
+</file>
+
+<file path=customXml/item57.xml><?xml version="1.0" encoding="utf-8"?>
+<Control xmlns="http://schemas.microsoft.com/VisualStudio/2011/storyboarding/control">
+  <Id Name="System.Storyboarding.Common.TextInput" Revision="1" Stencil="System.Storyboarding.Common" StencilVersion="0.1"/>
+</Control>
+</file>
+
+<file path=customXml/item58.xml><?xml version="1.0" encoding="utf-8"?>
+<Control xmlns="http://schemas.microsoft.com/VisualStudio/2011/storyboarding/control">
+  <Id Name="System.Storyboarding.Common.Text" Revision="1" Stencil="System.Storyboarding.Common" StencilVersion="0.1"/>
+</Control>
+</file>
+
+<file path=customXml/item59.xml><?xml version="1.0" encoding="utf-8"?>
+<Control xmlns="http://schemas.microsoft.com/VisualStudio/2011/storyboarding/control">
+  <Id Name="System.Storyboarding.Common.TextInput" Revision="1" Stencil="System.Storyboarding.Common" StencilVersion="0.1"/>
+</Control>
+</file>
+
+<file path=customXml/item6.xml><?xml version="1.0" encoding="utf-8"?>
 <Control xmlns="http://schemas.microsoft.com/VisualStudio/2011/storyboarding/control">
   <Id Name="System.Storyboarding.Annotation.StickyNote" Revision="1" Stencil="System.Storyboarding.Annotation" StencilVersion="0.1"/>
 </Control>
 </file>
 
-<file path=customXml/item39.xml><?xml version="1.0" encoding="utf-8"?>
+<file path=customXml/item60.xml><?xml version="1.0" encoding="utf-8"?>
 <Control xmlns="http://schemas.microsoft.com/VisualStudio/2011/storyboarding/control">
-  <Id Name="System.Storyboarding.Annotation.StickyNote" Revision="1" Stencil="System.Storyboarding.Annotation" StencilVersion="0.1"/>
+  <Id Name="System.Storyboarding.Common.Text" Revision="1" Stencil="System.Storyboarding.Common" StencilVersion="0.1"/>
 </Control>
 </file>
 
-<file path=customXml/item4.xml><?xml version="1.0" encoding="utf-8"?>
+<file path=customXml/item61.xml><?xml version="1.0" encoding="utf-8"?>
 <Control xmlns="http://schemas.microsoft.com/VisualStudio/2011/storyboarding/control">
-  <Id Name="System.Storyboarding.Common.Hyperlink" Revision="1" Stencil="System.Storyboarding.Common" StencilVersion="0.1"/>
+  <Id Name="System.Storyboarding.Common.TextInput" Revision="1" Stencil="System.Storyboarding.Common" StencilVersion="0.1"/>
 </Control>
 </file>
 
-<file path=customXml/item5.xml><?xml version="1.0" encoding="utf-8"?>
+<file path=customXml/item62.xml><?xml version="1.0" encoding="utf-8"?>
 <Control xmlns="http://schemas.microsoft.com/VisualStudio/2011/storyboarding/control">
-  <Id Name="System.Storyboarding.Annotation.StickyNote" Revision="1" Stencil="System.Storyboarding.Annotation" StencilVersion="0.1"/>
-</Control>
-</file>
-
-<file path=customXml/item6.xml><?xml version="1.0" encoding="utf-8"?>
-<Control xmlns="http://schemas.microsoft.com/VisualStudio/2011/storyboarding/control">
-  <Id Name="System.Storyboarding.Backgrounds.WebBrowser" Revision="1" Stencil="System.Storyboarding.Backgrounds" StencilVersion="0.1"/>
+  <Id Name="System.Storyboarding.Common.Button" Revision="1" Stencil="System.Storyboarding.Common" StencilVersion="0.1"/>
 </Control>
 </file>
 
@@ -7320,17 +10240,33 @@
 
 <file path=customXml/item8.xml><?xml version="1.0" encoding="utf-8"?>
 <Control xmlns="http://schemas.microsoft.com/VisualStudio/2011/storyboarding/control">
-  <Id Name="System.Storyboarding.Common.Text" Revision="1" Stencil="System.Storyboarding.Common" StencilVersion="0.1"/>
+  <Id Name="System.Storyboarding.Common.Hyperlink" Revision="1" Stencil="System.Storyboarding.Common" StencilVersion="0.1"/>
 </Control>
 </file>
 
 <file path=customXml/item9.xml><?xml version="1.0" encoding="utf-8"?>
 <Control xmlns="http://schemas.microsoft.com/VisualStudio/2011/storyboarding/control">
-  <Id Name="System.Storyboarding.Common.Text" Revision="1" Stencil="System.Storyboarding.Common" StencilVersion="0.1"/>
+  <Id Name="System.Storyboarding.Annotation.StickyNote" Revision="1" Stencil="System.Storyboarding.Annotation" StencilVersion="0.1"/>
 </Control>
 </file>
 
 <file path=customXml/itemProps1.xml><?xml version="1.0" encoding="utf-8"?>
+<ds:datastoreItem xmlns:ds="http://schemas.openxmlformats.org/officeDocument/2006/customXml" ds:itemID="{42C15F2B-6105-475C-A68A-D716FF4285C5}">
+  <ds:schemaRefs>
+    <ds:schemaRef ds:uri="http://schemas.microsoft.com/VisualStudio/2011/storyboarding/control"/>
+  </ds:schemaRefs>
+</ds:datastoreItem>
+</file>
+
+<file path=customXml/itemProps10.xml><?xml version="1.0" encoding="utf-8"?>
+<ds:datastoreItem xmlns:ds="http://schemas.openxmlformats.org/officeDocument/2006/customXml" ds:itemID="{9EAC57DA-521B-4815-BEFD-208CD216BAC0}">
+  <ds:schemaRefs>
+    <ds:schemaRef ds:uri="http://schemas.microsoft.com/VisualStudio/2011/storyboarding/control"/>
+  </ds:schemaRefs>
+</ds:datastoreItem>
+</file>
+
+<file path=customXml/itemProps11.xml><?xml version="1.0" encoding="utf-8"?>
 <ds:datastoreItem xmlns:ds="http://schemas.openxmlformats.org/officeDocument/2006/customXml" ds:itemID="{077C8EE2-1723-41C6-B6DF-AD16DABD5DEB}">
   <ds:schemaRefs>
     <ds:schemaRef ds:uri="http://schemas.microsoft.com/VisualStudio/2011/storyboarding/control"/>
@@ -7338,7 +10274,95 @@
 </ds:datastoreItem>
 </file>
 
-<file path=customXml/itemProps10.xml><?xml version="1.0" encoding="utf-8"?>
+<file path=customXml/itemProps12.xml><?xml version="1.0" encoding="utf-8"?>
+<ds:datastoreItem xmlns:ds="http://schemas.openxmlformats.org/officeDocument/2006/customXml" ds:itemID="{4CE1F33C-8D55-480A-BA3E-B8E105753FFA}">
+  <ds:schemaRefs>
+    <ds:schemaRef ds:uri="http://schemas.microsoft.com/VisualStudio/2011/storyboarding/control"/>
+  </ds:schemaRefs>
+</ds:datastoreItem>
+</file>
+
+<file path=customXml/itemProps13.xml><?xml version="1.0" encoding="utf-8"?>
+<ds:datastoreItem xmlns:ds="http://schemas.openxmlformats.org/officeDocument/2006/customXml" ds:itemID="{BDC33C2C-BB38-487D-8B6E-DBDDB1EB1512}">
+  <ds:schemaRefs>
+    <ds:schemaRef ds:uri="http://schemas.microsoft.com/VisualStudio/2011/storyboarding/control"/>
+  </ds:schemaRefs>
+</ds:datastoreItem>
+</file>
+
+<file path=customXml/itemProps14.xml><?xml version="1.0" encoding="utf-8"?>
+<ds:datastoreItem xmlns:ds="http://schemas.openxmlformats.org/officeDocument/2006/customXml" ds:itemID="{2C5203E7-9B41-4203-BCB3-A3851BC98D97}">
+  <ds:schemaRefs>
+    <ds:schemaRef ds:uri="http://schemas.microsoft.com/VisualStudio/2011/storyboarding/control"/>
+  </ds:schemaRefs>
+</ds:datastoreItem>
+</file>
+
+<file path=customXml/itemProps15.xml><?xml version="1.0" encoding="utf-8"?>
+<ds:datastoreItem xmlns:ds="http://schemas.openxmlformats.org/officeDocument/2006/customXml" ds:itemID="{042F1D1A-E6D0-406D-8E79-AF392805ABF1}">
+  <ds:schemaRefs>
+    <ds:schemaRef ds:uri="http://schemas.microsoft.com/VisualStudio/2011/storyboarding/control"/>
+  </ds:schemaRefs>
+</ds:datastoreItem>
+</file>
+
+<file path=customXml/itemProps16.xml><?xml version="1.0" encoding="utf-8"?>
+<ds:datastoreItem xmlns:ds="http://schemas.openxmlformats.org/officeDocument/2006/customXml" ds:itemID="{6B2B3A68-F791-4A2A-8FB5-86BAC628D3AF}">
+  <ds:schemaRefs>
+    <ds:schemaRef ds:uri="http://schemas.microsoft.com/VisualStudio/2011/storyboarding/control"/>
+  </ds:schemaRefs>
+</ds:datastoreItem>
+</file>
+
+<file path=customXml/itemProps17.xml><?xml version="1.0" encoding="utf-8"?>
+<ds:datastoreItem xmlns:ds="http://schemas.openxmlformats.org/officeDocument/2006/customXml" ds:itemID="{AB5C5238-63C6-4A37-A143-90D9FC6A2905}">
+  <ds:schemaRefs>
+    <ds:schemaRef ds:uri="http://schemas.microsoft.com/VisualStudio/2011/storyboarding/control"/>
+  </ds:schemaRefs>
+</ds:datastoreItem>
+</file>
+
+<file path=customXml/itemProps18.xml><?xml version="1.0" encoding="utf-8"?>
+<ds:datastoreItem xmlns:ds="http://schemas.openxmlformats.org/officeDocument/2006/customXml" ds:itemID="{0B0252B2-1336-48CD-9A50-DDFFE51E0F23}">
+  <ds:schemaRefs>
+    <ds:schemaRef ds:uri="http://schemas.microsoft.com/VisualStudio/2011/storyboarding/control"/>
+  </ds:schemaRefs>
+</ds:datastoreItem>
+</file>
+
+<file path=customXml/itemProps19.xml><?xml version="1.0" encoding="utf-8"?>
+<ds:datastoreItem xmlns:ds="http://schemas.openxmlformats.org/officeDocument/2006/customXml" ds:itemID="{3C0655A2-C753-4B96-A3F4-5A8EEFDB8391}">
+  <ds:schemaRefs>
+    <ds:schemaRef ds:uri="http://schemas.microsoft.com/VisualStudio/2011/storyboarding/control"/>
+  </ds:schemaRefs>
+</ds:datastoreItem>
+</file>
+
+<file path=customXml/itemProps2.xml><?xml version="1.0" encoding="utf-8"?>
+<ds:datastoreItem xmlns:ds="http://schemas.openxmlformats.org/officeDocument/2006/customXml" ds:itemID="{5B6497B2-D8DB-4D6A-8E91-B2DF31246B71}">
+  <ds:schemaRefs>
+    <ds:schemaRef ds:uri="http://schemas.microsoft.com/VisualStudio/2011/storyboarding/control"/>
+  </ds:schemaRefs>
+</ds:datastoreItem>
+</file>
+
+<file path=customXml/itemProps20.xml><?xml version="1.0" encoding="utf-8"?>
+<ds:datastoreItem xmlns:ds="http://schemas.openxmlformats.org/officeDocument/2006/customXml" ds:itemID="{C4BE46CB-0856-4054-9332-4F594C61D32A}">
+  <ds:schemaRefs>
+    <ds:schemaRef ds:uri="http://schemas.microsoft.com/VisualStudio/2011/storyboarding/control"/>
+  </ds:schemaRefs>
+</ds:datastoreItem>
+</file>
+
+<file path=customXml/itemProps21.xml><?xml version="1.0" encoding="utf-8"?>
+<ds:datastoreItem xmlns:ds="http://schemas.openxmlformats.org/officeDocument/2006/customXml" ds:itemID="{E43409D0-85F7-4F52-B157-A90FD9611BC5}">
+  <ds:schemaRefs>
+    <ds:schemaRef ds:uri="http://schemas.microsoft.com/VisualStudio/2011/storyboarding/control"/>
+  </ds:schemaRefs>
+</ds:datastoreItem>
+</file>
+
+<file path=customXml/itemProps22.xml><?xml version="1.0" encoding="utf-8"?>
 <ds:datastoreItem xmlns:ds="http://schemas.openxmlformats.org/officeDocument/2006/customXml" ds:itemID="{4623F4B4-F8E9-4E16-B74E-B6EC8F3DD70F}">
   <ds:schemaRefs>
     <ds:schemaRef ds:uri="http://schemas.microsoft.com/VisualStudio/2011/storyboarding/control"/>
@@ -7346,31 +10370,39 @@
 </ds:datastoreItem>
 </file>
 
-<file path=customXml/itemProps11.xml><?xml version="1.0" encoding="utf-8"?>
-<ds:datastoreItem xmlns:ds="http://schemas.openxmlformats.org/officeDocument/2006/customXml" ds:itemID="{BDC33C2C-BB38-487D-8B6E-DBDDB1EB1512}">
+<file path=customXml/itemProps23.xml><?xml version="1.0" encoding="utf-8"?>
+<ds:datastoreItem xmlns:ds="http://schemas.openxmlformats.org/officeDocument/2006/customXml" ds:itemID="{5732081C-EEB6-4BCC-8E99-61C342627A9E}">
   <ds:schemaRefs>
     <ds:schemaRef ds:uri="http://schemas.microsoft.com/VisualStudio/2011/storyboarding/control"/>
   </ds:schemaRefs>
 </ds:datastoreItem>
 </file>
 
-<file path=customXml/itemProps12.xml><?xml version="1.0" encoding="utf-8"?>
-<ds:datastoreItem xmlns:ds="http://schemas.openxmlformats.org/officeDocument/2006/customXml" ds:itemID="{5B6497B2-D8DB-4D6A-8E91-B2DF31246B71}">
+<file path=customXml/itemProps24.xml><?xml version="1.0" encoding="utf-8"?>
+<ds:datastoreItem xmlns:ds="http://schemas.openxmlformats.org/officeDocument/2006/customXml" ds:itemID="{05D615A2-73BB-429E-BBC0-0B436E12EA75}">
   <ds:schemaRefs>
     <ds:schemaRef ds:uri="http://schemas.microsoft.com/VisualStudio/2011/storyboarding/control"/>
   </ds:schemaRefs>
 </ds:datastoreItem>
 </file>
 
-<file path=customXml/itemProps13.xml><?xml version="1.0" encoding="utf-8"?>
-<ds:datastoreItem xmlns:ds="http://schemas.openxmlformats.org/officeDocument/2006/customXml" ds:itemID="{44D5AE6D-5198-46FB-BE2E-353E799B500D}">
+<file path=customXml/itemProps25.xml><?xml version="1.0" encoding="utf-8"?>
+<ds:datastoreItem xmlns:ds="http://schemas.openxmlformats.org/officeDocument/2006/customXml" ds:itemID="{F58EF3AC-2BC8-4437-AA7F-DC3942B9C40D}">
   <ds:schemaRefs>
     <ds:schemaRef ds:uri="http://schemas.microsoft.com/VisualStudio/2011/storyboarding/control"/>
   </ds:schemaRefs>
 </ds:datastoreItem>
 </file>
 
-<file path=customXml/itemProps14.xml><?xml version="1.0" encoding="utf-8"?>
+<file path=customXml/itemProps26.xml><?xml version="1.0" encoding="utf-8"?>
+<ds:datastoreItem xmlns:ds="http://schemas.openxmlformats.org/officeDocument/2006/customXml" ds:itemID="{F46C6733-20F6-4F90-A562-9A13717F6AD0}">
+  <ds:schemaRefs>
+    <ds:schemaRef ds:uri="http://schemas.microsoft.com/VisualStudio/2011/storyboarding/control"/>
+  </ds:schemaRefs>
+</ds:datastoreItem>
+</file>
+
+<file path=customXml/itemProps27.xml><?xml version="1.0" encoding="utf-8"?>
 <ds:datastoreItem xmlns:ds="http://schemas.openxmlformats.org/officeDocument/2006/customXml" ds:itemID="{8D648AEB-A8B5-4CD7-AE0B-2276E075366E}">
   <ds:schemaRefs>
     <ds:schemaRef ds:uri="http://schemas.microsoft.com/VisualStudio/2011/storyboarding/control"/>
@@ -7378,71 +10410,7 @@
 </ds:datastoreItem>
 </file>
 
-<file path=customXml/itemProps15.xml><?xml version="1.0" encoding="utf-8"?>
-<ds:datastoreItem xmlns:ds="http://schemas.openxmlformats.org/officeDocument/2006/customXml" ds:itemID="{0B0252B2-1336-48CD-9A50-DDFFE51E0F23}">
-  <ds:schemaRefs>
-    <ds:schemaRef ds:uri="http://schemas.microsoft.com/VisualStudio/2011/storyboarding/control"/>
-  </ds:schemaRefs>
-</ds:datastoreItem>
-</file>
-
-<file path=customXml/itemProps16.xml><?xml version="1.0" encoding="utf-8"?>
-<ds:datastoreItem xmlns:ds="http://schemas.openxmlformats.org/officeDocument/2006/customXml" ds:itemID="{21FB55CB-9021-46DC-8260-2DDAE1E76651}">
-  <ds:schemaRefs>
-    <ds:schemaRef ds:uri="http://schemas.microsoft.com/VisualStudio/2011/storyboarding/control"/>
-  </ds:schemaRefs>
-</ds:datastoreItem>
-</file>
-
-<file path=customXml/itemProps17.xml><?xml version="1.0" encoding="utf-8"?>
-<ds:datastoreItem xmlns:ds="http://schemas.openxmlformats.org/officeDocument/2006/customXml" ds:itemID="{98ACB0B0-984A-4555-B9FE-D2D093037966}">
-  <ds:schemaRefs>
-    <ds:schemaRef ds:uri="http://schemas.microsoft.com/VisualStudio/2011/storyboarding/control"/>
-  </ds:schemaRefs>
-</ds:datastoreItem>
-</file>
-
-<file path=customXml/itemProps18.xml><?xml version="1.0" encoding="utf-8"?>
-<ds:datastoreItem xmlns:ds="http://schemas.openxmlformats.org/officeDocument/2006/customXml" ds:itemID="{08535922-E3B1-4C6D-895D-4CA0CD6474EF}">
-  <ds:schemaRefs>
-    <ds:schemaRef ds:uri="http://schemas.microsoft.com/VisualStudio/2011/storyboarding/control"/>
-  </ds:schemaRefs>
-</ds:datastoreItem>
-</file>
-
-<file path=customXml/itemProps19.xml><?xml version="1.0" encoding="utf-8"?>
-<ds:datastoreItem xmlns:ds="http://schemas.openxmlformats.org/officeDocument/2006/customXml" ds:itemID="{5732081C-EEB6-4BCC-8E99-61C342627A9E}">
-  <ds:schemaRefs>
-    <ds:schemaRef ds:uri="http://schemas.microsoft.com/VisualStudio/2011/storyboarding/control"/>
-  </ds:schemaRefs>
-</ds:datastoreItem>
-</file>
-
-<file path=customXml/itemProps2.xml><?xml version="1.0" encoding="utf-8"?>
-<ds:datastoreItem xmlns:ds="http://schemas.openxmlformats.org/officeDocument/2006/customXml" ds:itemID="{4F7B3B4E-CF2C-4DE1-BDD0-B29711800AB6}">
-  <ds:schemaRefs>
-    <ds:schemaRef ds:uri="http://schemas.microsoft.com/VisualStudio/2011/storyboarding/control"/>
-  </ds:schemaRefs>
-</ds:datastoreItem>
-</file>
-
-<file path=customXml/itemProps20.xml><?xml version="1.0" encoding="utf-8"?>
-<ds:datastoreItem xmlns:ds="http://schemas.openxmlformats.org/officeDocument/2006/customXml" ds:itemID="{B25CF1C5-5B34-473E-8DE3-1EA20019494E}">
-  <ds:schemaRefs>
-    <ds:schemaRef ds:uri="http://schemas.microsoft.com/VisualStudio/2011/storyboarding/control"/>
-  </ds:schemaRefs>
-</ds:datastoreItem>
-</file>
-
-<file path=customXml/itemProps21.xml><?xml version="1.0" encoding="utf-8"?>
-<ds:datastoreItem xmlns:ds="http://schemas.openxmlformats.org/officeDocument/2006/customXml" ds:itemID="{ADC30B13-CD72-46E9-845D-D9F461CAB154}">
-  <ds:schemaRefs>
-    <ds:schemaRef ds:uri="http://schemas.microsoft.com/VisualStudio/2011/storyboarding/control"/>
-  </ds:schemaRefs>
-</ds:datastoreItem>
-</file>
-
-<file path=customXml/itemProps22.xml><?xml version="1.0" encoding="utf-8"?>
+<file path=customXml/itemProps28.xml><?xml version="1.0" encoding="utf-8"?>
 <ds:datastoreItem xmlns:ds="http://schemas.openxmlformats.org/officeDocument/2006/customXml" ds:itemID="{47420CCC-9E1E-4BEA-9528-D9CD31898391}">
   <ds:schemaRefs>
     <ds:schemaRef ds:uri="http://schemas.microsoft.com/VisualStudio/2011/storyboarding/control"/>
@@ -7450,39 +10418,7 @@
 </ds:datastoreItem>
 </file>
 
-<file path=customXml/itemProps23.xml><?xml version="1.0" encoding="utf-8"?>
-<ds:datastoreItem xmlns:ds="http://schemas.openxmlformats.org/officeDocument/2006/customXml" ds:itemID="{3C0655A2-C753-4B96-A3F4-5A8EEFDB8391}">
-  <ds:schemaRefs>
-    <ds:schemaRef ds:uri="http://schemas.microsoft.com/VisualStudio/2011/storyboarding/control"/>
-  </ds:schemaRefs>
-</ds:datastoreItem>
-</file>
-
-<file path=customXml/itemProps24.xml><?xml version="1.0" encoding="utf-8"?>
-<ds:datastoreItem xmlns:ds="http://schemas.openxmlformats.org/officeDocument/2006/customXml" ds:itemID="{2C5203E7-9B41-4203-BCB3-A3851BC98D97}">
-  <ds:schemaRefs>
-    <ds:schemaRef ds:uri="http://schemas.microsoft.com/VisualStudio/2011/storyboarding/control"/>
-  </ds:schemaRefs>
-</ds:datastoreItem>
-</file>
-
-<file path=customXml/itemProps25.xml><?xml version="1.0" encoding="utf-8"?>
-<ds:datastoreItem xmlns:ds="http://schemas.openxmlformats.org/officeDocument/2006/customXml" ds:itemID="{98DF57AF-CB99-4F92-A117-9EC8946FE11F}">
-  <ds:schemaRefs>
-    <ds:schemaRef ds:uri="http://schemas.microsoft.com/VisualStudio/2011/storyboarding/control"/>
-  </ds:schemaRefs>
-</ds:datastoreItem>
-</file>
-
-<file path=customXml/itemProps26.xml><?xml version="1.0" encoding="utf-8"?>
-<ds:datastoreItem xmlns:ds="http://schemas.openxmlformats.org/officeDocument/2006/customXml" ds:itemID="{8CBE77A9-E236-4C06-9E52-7446FCE11B01}">
-  <ds:schemaRefs>
-    <ds:schemaRef ds:uri="http://schemas.microsoft.com/VisualStudio/2011/storyboarding/control"/>
-  </ds:schemaRefs>
-</ds:datastoreItem>
-</file>
-
-<file path=customXml/itemProps27.xml><?xml version="1.0" encoding="utf-8"?>
+<file path=customXml/itemProps29.xml><?xml version="1.0" encoding="utf-8"?>
 <ds:datastoreItem xmlns:ds="http://schemas.openxmlformats.org/officeDocument/2006/customXml" ds:itemID="{CCB8E0B1-409E-4218-B712-F8898DF6CCB1}">
   <ds:schemaRefs>
     <ds:schemaRef ds:uri="http://schemas.microsoft.com/VisualStudio/2011/storyboarding/control"/>
@@ -7490,24 +10426,8 @@
 </ds:datastoreItem>
 </file>
 
-<file path=customXml/itemProps28.xml><?xml version="1.0" encoding="utf-8"?>
-<ds:datastoreItem xmlns:ds="http://schemas.openxmlformats.org/officeDocument/2006/customXml" ds:itemID="{C4BE46CB-0856-4054-9332-4F594C61D32A}">
-  <ds:schemaRefs>
-    <ds:schemaRef ds:uri="http://schemas.microsoft.com/VisualStudio/2011/storyboarding/control"/>
-  </ds:schemaRefs>
-</ds:datastoreItem>
-</file>
-
-<file path=customXml/itemProps29.xml><?xml version="1.0" encoding="utf-8"?>
-<ds:datastoreItem xmlns:ds="http://schemas.openxmlformats.org/officeDocument/2006/customXml" ds:itemID="{9EAC57DA-521B-4815-BEFD-208CD216BAC0}">
-  <ds:schemaRefs>
-    <ds:schemaRef ds:uri="http://schemas.microsoft.com/VisualStudio/2011/storyboarding/control"/>
-  </ds:schemaRefs>
-</ds:datastoreItem>
-</file>
-
 <file path=customXml/itemProps3.xml><?xml version="1.0" encoding="utf-8"?>
-<ds:datastoreItem xmlns:ds="http://schemas.openxmlformats.org/officeDocument/2006/customXml" ds:itemID="{07E663D7-DAD6-4F3D-AA2A-7428853289F0}">
+<ds:datastoreItem xmlns:ds="http://schemas.openxmlformats.org/officeDocument/2006/customXml" ds:itemID="{98ACB0B0-984A-4555-B9FE-D2D093037966}">
   <ds:schemaRefs>
     <ds:schemaRef ds:uri="http://schemas.microsoft.com/VisualStudio/2011/storyboarding/control"/>
   </ds:schemaRefs>
@@ -7523,7 +10443,7 @@
 </file>
 
 <file path=customXml/itemProps31.xml><?xml version="1.0" encoding="utf-8"?>
-<ds:datastoreItem xmlns:ds="http://schemas.openxmlformats.org/officeDocument/2006/customXml" ds:itemID="{05D615A2-73BB-429E-BBC0-0B436E12EA75}">
+<ds:datastoreItem xmlns:ds="http://schemas.openxmlformats.org/officeDocument/2006/customXml" ds:itemID="{11040597-2E5F-4E2E-8688-9DC1F1A31421}">
   <ds:schemaRefs>
     <ds:schemaRef ds:uri="http://schemas.microsoft.com/VisualStudio/2011/storyboarding/control"/>
   </ds:schemaRefs>
@@ -7531,7 +10451,7 @@
 </file>
 
 <file path=customXml/itemProps32.xml><?xml version="1.0" encoding="utf-8"?>
-<ds:datastoreItem xmlns:ds="http://schemas.openxmlformats.org/officeDocument/2006/customXml" ds:itemID="{042F1D1A-E6D0-406D-8E79-AF392805ABF1}">
+<ds:datastoreItem xmlns:ds="http://schemas.openxmlformats.org/officeDocument/2006/customXml" ds:itemID="{FFF935EE-E92C-42F8-9741-A3F6B525554E}">
   <ds:schemaRefs>
     <ds:schemaRef ds:uri="http://schemas.microsoft.com/VisualStudio/2011/storyboarding/control"/>
   </ds:schemaRefs>
@@ -7539,6 +10459,150 @@
 </file>
 
 <file path=customXml/itemProps33.xml><?xml version="1.0" encoding="utf-8"?>
+<ds:datastoreItem xmlns:ds="http://schemas.openxmlformats.org/officeDocument/2006/customXml" ds:itemID="{44D5AE6D-5198-46FB-BE2E-353E799B500D}">
+  <ds:schemaRefs>
+    <ds:schemaRef ds:uri="http://schemas.microsoft.com/VisualStudio/2011/storyboarding/control"/>
+  </ds:schemaRefs>
+</ds:datastoreItem>
+</file>
+
+<file path=customXml/itemProps34.xml><?xml version="1.0" encoding="utf-8"?>
+<ds:datastoreItem xmlns:ds="http://schemas.openxmlformats.org/officeDocument/2006/customXml" ds:itemID="{08535922-E3B1-4C6D-895D-4CA0CD6474EF}">
+  <ds:schemaRefs>
+    <ds:schemaRef ds:uri="http://schemas.microsoft.com/VisualStudio/2011/storyboarding/control"/>
+  </ds:schemaRefs>
+</ds:datastoreItem>
+</file>
+
+<file path=customXml/itemProps35.xml><?xml version="1.0" encoding="utf-8"?>
+<ds:datastoreItem xmlns:ds="http://schemas.openxmlformats.org/officeDocument/2006/customXml" ds:itemID="{8CBE77A9-E236-4C06-9E52-7446FCE11B01}">
+  <ds:schemaRefs>
+    <ds:schemaRef ds:uri="http://schemas.microsoft.com/VisualStudio/2011/storyboarding/control"/>
+  </ds:schemaRefs>
+</ds:datastoreItem>
+</file>
+
+<file path=customXml/itemProps36.xml><?xml version="1.0" encoding="utf-8"?>
+<ds:datastoreItem xmlns:ds="http://schemas.openxmlformats.org/officeDocument/2006/customXml" ds:itemID="{BA2694D9-5FE8-4C84-8233-910FF0BB9338}">
+  <ds:schemaRefs>
+    <ds:schemaRef ds:uri="http://schemas.microsoft.com/VisualStudio/2011/storyboarding/control"/>
+  </ds:schemaRefs>
+</ds:datastoreItem>
+</file>
+
+<file path=customXml/itemProps37.xml><?xml version="1.0" encoding="utf-8"?>
+<ds:datastoreItem xmlns:ds="http://schemas.openxmlformats.org/officeDocument/2006/customXml" ds:itemID="{07E663D7-DAD6-4F3D-AA2A-7428853289F0}">
+  <ds:schemaRefs>
+    <ds:schemaRef ds:uri="http://schemas.microsoft.com/VisualStudio/2011/storyboarding/control"/>
+  </ds:schemaRefs>
+</ds:datastoreItem>
+</file>
+
+<file path=customXml/itemProps38.xml><?xml version="1.0" encoding="utf-8"?>
+<ds:datastoreItem xmlns:ds="http://schemas.openxmlformats.org/officeDocument/2006/customXml" ds:itemID="{ADC30B13-CD72-46E9-845D-D9F461CAB154}">
+  <ds:schemaRefs>
+    <ds:schemaRef ds:uri="http://schemas.microsoft.com/VisualStudio/2011/storyboarding/control"/>
+  </ds:schemaRefs>
+</ds:datastoreItem>
+</file>
+
+<file path=customXml/itemProps39.xml><?xml version="1.0" encoding="utf-8"?>
+<ds:datastoreItem xmlns:ds="http://schemas.openxmlformats.org/officeDocument/2006/customXml" ds:itemID="{667518CA-725E-494C-A1C1-CAC420F86008}">
+  <ds:schemaRefs>
+    <ds:schemaRef ds:uri="http://schemas.microsoft.com/VisualStudio/2011/storyboarding/control"/>
+  </ds:schemaRefs>
+</ds:datastoreItem>
+</file>
+
+<file path=customXml/itemProps4.xml><?xml version="1.0" encoding="utf-8"?>
+<ds:datastoreItem xmlns:ds="http://schemas.openxmlformats.org/officeDocument/2006/customXml" ds:itemID="{98DF57AF-CB99-4F92-A117-9EC8946FE11F}">
+  <ds:schemaRefs>
+    <ds:schemaRef ds:uri="http://schemas.microsoft.com/VisualStudio/2011/storyboarding/control"/>
+  </ds:schemaRefs>
+</ds:datastoreItem>
+</file>
+
+<file path=customXml/itemProps40.xml><?xml version="1.0" encoding="utf-8"?>
+<ds:datastoreItem xmlns:ds="http://schemas.openxmlformats.org/officeDocument/2006/customXml" ds:itemID="{8AE60747-795E-4EED-94E4-C64E1B27DB63}">
+  <ds:schemaRefs>
+    <ds:schemaRef ds:uri="http://schemas.microsoft.com/VisualStudio/2011/storyboarding/control"/>
+  </ds:schemaRefs>
+</ds:datastoreItem>
+</file>
+
+<file path=customXml/itemProps41.xml><?xml version="1.0" encoding="utf-8"?>
+<ds:datastoreItem xmlns:ds="http://schemas.openxmlformats.org/officeDocument/2006/customXml" ds:itemID="{49762F0E-82A8-4528-BE7E-881E726B5B19}">
+  <ds:schemaRefs>
+    <ds:schemaRef ds:uri="http://schemas.microsoft.com/VisualStudio/2011/storyboarding/control"/>
+  </ds:schemaRefs>
+</ds:datastoreItem>
+</file>
+
+<file path=customXml/itemProps42.xml><?xml version="1.0" encoding="utf-8"?>
+<ds:datastoreItem xmlns:ds="http://schemas.openxmlformats.org/officeDocument/2006/customXml" ds:itemID="{025EB96A-F918-49DF-B536-ED50CBF3A516}">
+  <ds:schemaRefs>
+    <ds:schemaRef ds:uri="http://schemas.microsoft.com/VisualStudio/2011/storyboarding/control"/>
+  </ds:schemaRefs>
+</ds:datastoreItem>
+</file>
+
+<file path=customXml/itemProps43.xml><?xml version="1.0" encoding="utf-8"?>
+<ds:datastoreItem xmlns:ds="http://schemas.openxmlformats.org/officeDocument/2006/customXml" ds:itemID="{B06E44E5-7EF9-4C8F-98A9-10B40E8EA39C}">
+  <ds:schemaRefs>
+    <ds:schemaRef ds:uri="http://schemas.microsoft.com/VisualStudio/2011/storyboarding/control"/>
+  </ds:schemaRefs>
+</ds:datastoreItem>
+</file>
+
+<file path=customXml/itemProps44.xml><?xml version="1.0" encoding="utf-8"?>
+<ds:datastoreItem xmlns:ds="http://schemas.openxmlformats.org/officeDocument/2006/customXml" ds:itemID="{979AF062-2756-45D9-8ED1-B64A1824C1AE}">
+  <ds:schemaRefs>
+    <ds:schemaRef ds:uri="http://schemas.microsoft.com/VisualStudio/2011/storyboarding/control"/>
+  </ds:schemaRefs>
+</ds:datastoreItem>
+</file>
+
+<file path=customXml/itemProps45.xml><?xml version="1.0" encoding="utf-8"?>
+<ds:datastoreItem xmlns:ds="http://schemas.openxmlformats.org/officeDocument/2006/customXml" ds:itemID="{A488685B-A8E3-4F30-9EC5-505747653107}">
+  <ds:schemaRefs>
+    <ds:schemaRef ds:uri="http://schemas.microsoft.com/VisualStudio/2011/storyboarding/control"/>
+  </ds:schemaRefs>
+</ds:datastoreItem>
+</file>
+
+<file path=customXml/itemProps46.xml><?xml version="1.0" encoding="utf-8"?>
+<ds:datastoreItem xmlns:ds="http://schemas.openxmlformats.org/officeDocument/2006/customXml" ds:itemID="{CBBE2646-5D75-4161-96BE-A24244060422}">
+  <ds:schemaRefs>
+    <ds:schemaRef ds:uri="http://schemas.microsoft.com/VisualStudio/2011/storyboarding/control"/>
+  </ds:schemaRefs>
+</ds:datastoreItem>
+</file>
+
+<file path=customXml/itemProps47.xml><?xml version="1.0" encoding="utf-8"?>
+<ds:datastoreItem xmlns:ds="http://schemas.openxmlformats.org/officeDocument/2006/customXml" ds:itemID="{3E669226-8832-4192-A421-311446386FBE}">
+  <ds:schemaRefs>
+    <ds:schemaRef ds:uri="http://schemas.microsoft.com/VisualStudio/2011/storyboarding/control"/>
+  </ds:schemaRefs>
+</ds:datastoreItem>
+</file>
+
+<file path=customXml/itemProps48.xml><?xml version="1.0" encoding="utf-8"?>
+<ds:datastoreItem xmlns:ds="http://schemas.openxmlformats.org/officeDocument/2006/customXml" ds:itemID="{1439F3C0-CCB1-4203-B9A2-C6B137EEC899}">
+  <ds:schemaRefs>
+    <ds:schemaRef ds:uri="http://schemas.microsoft.com/VisualStudio/2011/storyboarding/control"/>
+  </ds:schemaRefs>
+</ds:datastoreItem>
+</file>
+
+<file path=customXml/itemProps49.xml><?xml version="1.0" encoding="utf-8"?>
+<ds:datastoreItem xmlns:ds="http://schemas.openxmlformats.org/officeDocument/2006/customXml" ds:itemID="{7FAC84A2-D23A-4474-8EE4-2E24F4CDEF59}">
+  <ds:schemaRefs>
+    <ds:schemaRef ds:uri="http://schemas.microsoft.com/VisualStudio/2011/storyboarding/control"/>
+  </ds:schemaRefs>
+</ds:datastoreItem>
+</file>
+
+<file path=customXml/itemProps5.xml><?xml version="1.0" encoding="utf-8"?>
 <ds:datastoreItem xmlns:ds="http://schemas.openxmlformats.org/officeDocument/2006/customXml" ds:itemID="{DE929AE7-DE00-43D4-9FD6-14182B19A6B1}">
   <ds:schemaRefs>
     <ds:schemaRef ds:uri="http://schemas.microsoft.com/VisualStudio/2011/storyboarding/control"/>
@@ -7546,39 +10610,87 @@
 </ds:datastoreItem>
 </file>
 
-<file path=customXml/itemProps34.xml><?xml version="1.0" encoding="utf-8"?>
-<ds:datastoreItem xmlns:ds="http://schemas.openxmlformats.org/officeDocument/2006/customXml" ds:itemID="{667518CA-725E-494C-A1C1-CAC420F86008}">
+<file path=customXml/itemProps50.xml><?xml version="1.0" encoding="utf-8"?>
+<ds:datastoreItem xmlns:ds="http://schemas.openxmlformats.org/officeDocument/2006/customXml" ds:itemID="{682A3ACB-78A6-4D4E-AEB9-AB621366D3F0}">
   <ds:schemaRefs>
     <ds:schemaRef ds:uri="http://schemas.microsoft.com/VisualStudio/2011/storyboarding/control"/>
   </ds:schemaRefs>
 </ds:datastoreItem>
 </file>
 
-<file path=customXml/itemProps35.xml><?xml version="1.0" encoding="utf-8"?>
-<ds:datastoreItem xmlns:ds="http://schemas.openxmlformats.org/officeDocument/2006/customXml" ds:itemID="{11040597-2E5F-4E2E-8688-9DC1F1A31421}">
+<file path=customXml/itemProps51.xml><?xml version="1.0" encoding="utf-8"?>
+<ds:datastoreItem xmlns:ds="http://schemas.openxmlformats.org/officeDocument/2006/customXml" ds:itemID="{CAEF0C10-893C-4CCD-BF59-7526C9FAB07D}">
   <ds:schemaRefs>
     <ds:schemaRef ds:uri="http://schemas.microsoft.com/VisualStudio/2011/storyboarding/control"/>
   </ds:schemaRefs>
 </ds:datastoreItem>
 </file>
 
-<file path=customXml/itemProps36.xml><?xml version="1.0" encoding="utf-8"?>
-<ds:datastoreItem xmlns:ds="http://schemas.openxmlformats.org/officeDocument/2006/customXml" ds:itemID="{E43409D0-85F7-4F52-B157-A90FD9611BC5}">
+<file path=customXml/itemProps52.xml><?xml version="1.0" encoding="utf-8"?>
+<ds:datastoreItem xmlns:ds="http://schemas.openxmlformats.org/officeDocument/2006/customXml" ds:itemID="{1532B346-5374-4909-93F9-CBB0116B9239}">
   <ds:schemaRefs>
     <ds:schemaRef ds:uri="http://schemas.microsoft.com/VisualStudio/2011/storyboarding/control"/>
   </ds:schemaRefs>
 </ds:datastoreItem>
 </file>
 
-<file path=customXml/itemProps37.xml><?xml version="1.0" encoding="utf-8"?>
-<ds:datastoreItem xmlns:ds="http://schemas.openxmlformats.org/officeDocument/2006/customXml" ds:itemID="{6B2B3A68-F791-4A2A-8FB5-86BAC628D3AF}">
+<file path=customXml/itemProps53.xml><?xml version="1.0" encoding="utf-8"?>
+<ds:datastoreItem xmlns:ds="http://schemas.openxmlformats.org/officeDocument/2006/customXml" ds:itemID="{0B6B4CFE-186A-4198-BDBB-2230FEED8178}">
   <ds:schemaRefs>
     <ds:schemaRef ds:uri="http://schemas.microsoft.com/VisualStudio/2011/storyboarding/control"/>
   </ds:schemaRefs>
 </ds:datastoreItem>
 </file>
 
-<file path=customXml/itemProps38.xml><?xml version="1.0" encoding="utf-8"?>
+<file path=customXml/itemProps54.xml><?xml version="1.0" encoding="utf-8"?>
+<ds:datastoreItem xmlns:ds="http://schemas.openxmlformats.org/officeDocument/2006/customXml" ds:itemID="{C7A61DA5-C4F0-4598-94EC-EC96BB01F5EF}">
+  <ds:schemaRefs>
+    <ds:schemaRef ds:uri="http://schemas.microsoft.com/VisualStudio/2011/storyboarding/control"/>
+  </ds:schemaRefs>
+</ds:datastoreItem>
+</file>
+
+<file path=customXml/itemProps55.xml><?xml version="1.0" encoding="utf-8"?>
+<ds:datastoreItem xmlns:ds="http://schemas.openxmlformats.org/officeDocument/2006/customXml" ds:itemID="{B196933C-76D9-444D-ACE8-EC980DEB3A9B}">
+  <ds:schemaRefs>
+    <ds:schemaRef ds:uri="http://schemas.microsoft.com/VisualStudio/2011/storyboarding/control"/>
+  </ds:schemaRefs>
+</ds:datastoreItem>
+</file>
+
+<file path=customXml/itemProps56.xml><?xml version="1.0" encoding="utf-8"?>
+<ds:datastoreItem xmlns:ds="http://schemas.openxmlformats.org/officeDocument/2006/customXml" ds:itemID="{30E27FD8-1A16-4A8B-9D42-034B7F98F648}">
+  <ds:schemaRefs>
+    <ds:schemaRef ds:uri="http://schemas.microsoft.com/VisualStudio/2011/storyboarding/control"/>
+  </ds:schemaRefs>
+</ds:datastoreItem>
+</file>
+
+<file path=customXml/itemProps57.xml><?xml version="1.0" encoding="utf-8"?>
+<ds:datastoreItem xmlns:ds="http://schemas.openxmlformats.org/officeDocument/2006/customXml" ds:itemID="{6D066FE1-1553-48C9-B584-15A61D75E52A}">
+  <ds:schemaRefs>
+    <ds:schemaRef ds:uri="http://schemas.microsoft.com/VisualStudio/2011/storyboarding/control"/>
+  </ds:schemaRefs>
+</ds:datastoreItem>
+</file>
+
+<file path=customXml/itemProps58.xml><?xml version="1.0" encoding="utf-8"?>
+<ds:datastoreItem xmlns:ds="http://schemas.openxmlformats.org/officeDocument/2006/customXml" ds:itemID="{2A686B81-090E-4504-BB68-12B9E1512542}">
+  <ds:schemaRefs>
+    <ds:schemaRef ds:uri="http://schemas.microsoft.com/VisualStudio/2011/storyboarding/control"/>
+  </ds:schemaRefs>
+</ds:datastoreItem>
+</file>
+
+<file path=customXml/itemProps59.xml><?xml version="1.0" encoding="utf-8"?>
+<ds:datastoreItem xmlns:ds="http://schemas.openxmlformats.org/officeDocument/2006/customXml" ds:itemID="{4A22C23B-5BB5-4A05-A851-666AB3905DE0}">
+  <ds:schemaRefs>
+    <ds:schemaRef ds:uri="http://schemas.microsoft.com/VisualStudio/2011/storyboarding/control"/>
+  </ds:schemaRefs>
+</ds:datastoreItem>
+</file>
+
+<file path=customXml/itemProps6.xml><?xml version="1.0" encoding="utf-8"?>
 <ds:datastoreItem xmlns:ds="http://schemas.openxmlformats.org/officeDocument/2006/customXml" ds:itemID="{5CC3A6AB-8151-4A46-A8BD-063C5B8328E6}">
   <ds:schemaRefs>
     <ds:schemaRef ds:uri="http://schemas.microsoft.com/VisualStudio/2011/storyboarding/control"/>
@@ -7586,56 +10698,48 @@
 </ds:datastoreItem>
 </file>
 
-<file path=customXml/itemProps39.xml><?xml version="1.0" encoding="utf-8"?>
-<ds:datastoreItem xmlns:ds="http://schemas.openxmlformats.org/officeDocument/2006/customXml" ds:itemID="{BA2694D9-5FE8-4C84-8233-910FF0BB9338}">
+<file path=customXml/itemProps60.xml><?xml version="1.0" encoding="utf-8"?>
+<ds:datastoreItem xmlns:ds="http://schemas.openxmlformats.org/officeDocument/2006/customXml" ds:itemID="{D94CC47E-2EF9-4F0D-AAD8-8A209E1777CC}">
   <ds:schemaRefs>
     <ds:schemaRef ds:uri="http://schemas.microsoft.com/VisualStudio/2011/storyboarding/control"/>
   </ds:schemaRefs>
 </ds:datastoreItem>
 </file>
 
-<file path=customXml/itemProps4.xml><?xml version="1.0" encoding="utf-8"?>
-<ds:datastoreItem xmlns:ds="http://schemas.openxmlformats.org/officeDocument/2006/customXml" ds:itemID="{F58EF3AC-2BC8-4437-AA7F-DC3942B9C40D}">
+<file path=customXml/itemProps61.xml><?xml version="1.0" encoding="utf-8"?>
+<ds:datastoreItem xmlns:ds="http://schemas.openxmlformats.org/officeDocument/2006/customXml" ds:itemID="{ABE6D434-07F5-41A7-B62D-C22EFEA67ADA}">
   <ds:schemaRefs>
     <ds:schemaRef ds:uri="http://schemas.microsoft.com/VisualStudio/2011/storyboarding/control"/>
   </ds:schemaRefs>
 </ds:datastoreItem>
 </file>
 
-<file path=customXml/itemProps5.xml><?xml version="1.0" encoding="utf-8"?>
-<ds:datastoreItem xmlns:ds="http://schemas.openxmlformats.org/officeDocument/2006/customXml" ds:itemID="{AB5C5238-63C6-4A37-A143-90D9FC6A2905}">
+<file path=customXml/itemProps62.xml><?xml version="1.0" encoding="utf-8"?>
+<ds:datastoreItem xmlns:ds="http://schemas.openxmlformats.org/officeDocument/2006/customXml" ds:itemID="{131A3C14-CE4A-4AE0-B403-E3A5734C61EF}">
   <ds:schemaRefs>
     <ds:schemaRef ds:uri="http://schemas.microsoft.com/VisualStudio/2011/storyboarding/control"/>
   </ds:schemaRefs>
 </ds:datastoreItem>
 </file>
 
-<file path=customXml/itemProps6.xml><?xml version="1.0" encoding="utf-8"?>
-<ds:datastoreItem xmlns:ds="http://schemas.openxmlformats.org/officeDocument/2006/customXml" ds:itemID="{4CE1F33C-8D55-480A-BA3E-B8E105753FFA}">
+<file path=customXml/itemProps7.xml><?xml version="1.0" encoding="utf-8"?>
+<ds:datastoreItem xmlns:ds="http://schemas.openxmlformats.org/officeDocument/2006/customXml" ds:itemID="{4F7B3B4E-CF2C-4DE1-BDD0-B29711800AB6}">
   <ds:schemaRefs>
     <ds:schemaRef ds:uri="http://schemas.microsoft.com/VisualStudio/2011/storyboarding/control"/>
   </ds:schemaRefs>
 </ds:datastoreItem>
 </file>
 
-<file path=customXml/itemProps7.xml><?xml version="1.0" encoding="utf-8"?>
-<ds:datastoreItem xmlns:ds="http://schemas.openxmlformats.org/officeDocument/2006/customXml" ds:itemID="{42C15F2B-6105-475C-A68A-D716FF4285C5}">
+<file path=customXml/itemProps8.xml><?xml version="1.0" encoding="utf-8"?>
+<ds:datastoreItem xmlns:ds="http://schemas.openxmlformats.org/officeDocument/2006/customXml" ds:itemID="{21FB55CB-9021-46DC-8260-2DDAE1E76651}">
   <ds:schemaRefs>
     <ds:schemaRef ds:uri="http://schemas.microsoft.com/VisualStudio/2011/storyboarding/control"/>
   </ds:schemaRefs>
 </ds:datastoreItem>
 </file>
 
-<file path=customXml/itemProps8.xml><?xml version="1.0" encoding="utf-8"?>
-<ds:datastoreItem xmlns:ds="http://schemas.openxmlformats.org/officeDocument/2006/customXml" ds:itemID="{FFF935EE-E92C-42F8-9741-A3F6B525554E}">
-  <ds:schemaRefs>
-    <ds:schemaRef ds:uri="http://schemas.microsoft.com/VisualStudio/2011/storyboarding/control"/>
-  </ds:schemaRefs>
-</ds:datastoreItem>
-</file>
-
 <file path=customXml/itemProps9.xml><?xml version="1.0" encoding="utf-8"?>
-<ds:datastoreItem xmlns:ds="http://schemas.openxmlformats.org/officeDocument/2006/customXml" ds:itemID="{F46C6733-20F6-4F90-A562-9A13717F6AD0}">
+<ds:datastoreItem xmlns:ds="http://schemas.openxmlformats.org/officeDocument/2006/customXml" ds:itemID="{B25CF1C5-5B34-473E-8DE3-1EA20019494E}">
   <ds:schemaRefs>
     <ds:schemaRef ds:uri="http://schemas.microsoft.com/VisualStudio/2011/storyboarding/control"/>
   </ds:schemaRefs>

</xml_diff>